<commit_message>
prepared th environment for the second homework
</commit_message>
<xml_diff>
--- a/homework1/Presentazione HOMEWORK1.pptx
+++ b/homework1/Presentazione HOMEWORK1.pptx
@@ -131,21 +131,77 @@
 </p:presentation>
 </file>
 
-<file path=ppt/revisionInfo.xml><?xml version="1.0" encoding="utf-8"?>
-<p1510:revInfo xmlns:a="http://schemas.openxmlformats.org/drawingml/2006/main" xmlns:r="http://schemas.openxmlformats.org/officeDocument/2006/relationships" xmlns:p1510="http://schemas.microsoft.com/office/powerpoint/2015/10/main">
-  <p1510:revLst>
-    <p1510:client id="{3C80D2C2-3092-4E1E-960D-0A285D277E83}" v="1171" dt="2024-10-18T14:19:53.265"/>
-    <p1510:client id="{50FCB51C-6EB4-4E8F-8823-7F985AF14E8D}" v="4" dt="2024-10-18T10:04:58.138"/>
-  </p1510:revLst>
-</p1510:revInfo>
-</file>
-
 <file path=ppt/changesInfos/changesInfo1.xml><?xml version="1.0" encoding="utf-8"?>
 <pc:chgInfo xmlns:a="http://schemas.openxmlformats.org/drawingml/2006/main" xmlns:r="http://schemas.openxmlformats.org/officeDocument/2006/relationships" xmlns:ac="http://schemas.microsoft.com/office/drawing/2013/main/command" xmlns:pc="http://schemas.microsoft.com/office/powerpoint/2013/main/command">
   <pc:docChgLst>
+    <pc:chgData name="DANIEL LUCA" userId="78733f4f-896c-4094-8820-7f01004358be" providerId="ADAL" clId="{0EEF1C55-39A0-4364-B36C-5263BC7BB6BF}"/>
+    <pc:docChg chg="undo custSel modSld">
+      <pc:chgData name="DANIEL LUCA" userId="78733f4f-896c-4094-8820-7f01004358be" providerId="ADAL" clId="{0EEF1C55-39A0-4364-B36C-5263BC7BB6BF}" dt="2024-10-22T14:20:28.534" v="4425" actId="20577"/>
+      <pc:docMkLst>
+        <pc:docMk/>
+      </pc:docMkLst>
+      <pc:sldChg chg="modNotesTx">
+        <pc:chgData name="DANIEL LUCA" userId="78733f4f-896c-4094-8820-7f01004358be" providerId="ADAL" clId="{0EEF1C55-39A0-4364-B36C-5263BC7BB6BF}" dt="2024-10-21T23:07:31.991" v="1753" actId="20577"/>
+        <pc:sldMkLst>
+          <pc:docMk/>
+          <pc:sldMk cId="1323163141" sldId="257"/>
+        </pc:sldMkLst>
+      </pc:sldChg>
+      <pc:sldChg chg="modNotesTx">
+        <pc:chgData name="DANIEL LUCA" userId="78733f4f-896c-4094-8820-7f01004358be" providerId="ADAL" clId="{0EEF1C55-39A0-4364-B36C-5263BC7BB6BF}" dt="2024-10-22T13:42:08.872" v="4421" actId="20577"/>
+        <pc:sldMkLst>
+          <pc:docMk/>
+          <pc:sldMk cId="2616788787" sldId="258"/>
+        </pc:sldMkLst>
+      </pc:sldChg>
+      <pc:sldChg chg="modNotesTx">
+        <pc:chgData name="DANIEL LUCA" userId="78733f4f-896c-4094-8820-7f01004358be" providerId="ADAL" clId="{0EEF1C55-39A0-4364-B36C-5263BC7BB6BF}" dt="2024-10-22T12:26:32.551" v="2525" actId="20577"/>
+        <pc:sldMkLst>
+          <pc:docMk/>
+          <pc:sldMk cId="965660984" sldId="259"/>
+        </pc:sldMkLst>
+      </pc:sldChg>
+      <pc:sldChg chg="modNotesTx">
+        <pc:chgData name="DANIEL LUCA" userId="78733f4f-896c-4094-8820-7f01004358be" providerId="ADAL" clId="{0EEF1C55-39A0-4364-B36C-5263BC7BB6BF}" dt="2024-10-21T23:04:45.598" v="1714" actId="20577"/>
+        <pc:sldMkLst>
+          <pc:docMk/>
+          <pc:sldMk cId="1700256613" sldId="260"/>
+        </pc:sldMkLst>
+      </pc:sldChg>
+      <pc:sldChg chg="modNotesTx">
+        <pc:chgData name="DANIEL LUCA" userId="78733f4f-896c-4094-8820-7f01004358be" providerId="ADAL" clId="{0EEF1C55-39A0-4364-B36C-5263BC7BB6BF}" dt="2024-10-22T14:20:28.534" v="4425" actId="20577"/>
+        <pc:sldMkLst>
+          <pc:docMk/>
+          <pc:sldMk cId="2210830722" sldId="262"/>
+        </pc:sldMkLst>
+      </pc:sldChg>
+      <pc:sldChg chg="modNotesTx">
+        <pc:chgData name="DANIEL LUCA" userId="78733f4f-896c-4094-8820-7f01004358be" providerId="ADAL" clId="{0EEF1C55-39A0-4364-B36C-5263BC7BB6BF}" dt="2024-10-22T12:24:39.151" v="2337" actId="20577"/>
+        <pc:sldMkLst>
+          <pc:docMk/>
+          <pc:sldMk cId="3016095279" sldId="263"/>
+        </pc:sldMkLst>
+      </pc:sldChg>
+      <pc:sldChg chg="modNotesTx">
+        <pc:chgData name="DANIEL LUCA" userId="78733f4f-896c-4094-8820-7f01004358be" providerId="ADAL" clId="{0EEF1C55-39A0-4364-B36C-5263BC7BB6BF}" dt="2024-10-22T12:29:00.849" v="2692" actId="20577"/>
+        <pc:sldMkLst>
+          <pc:docMk/>
+          <pc:sldMk cId="2423271011" sldId="265"/>
+        </pc:sldMkLst>
+      </pc:sldChg>
+      <pc:sldChg chg="modNotesTx">
+        <pc:chgData name="DANIEL LUCA" userId="78733f4f-896c-4094-8820-7f01004358be" providerId="ADAL" clId="{0EEF1C55-39A0-4364-B36C-5263BC7BB6BF}" dt="2024-10-22T12:34:50.305" v="2958" actId="20577"/>
+        <pc:sldMkLst>
+          <pc:docMk/>
+          <pc:sldMk cId="920878615" sldId="266"/>
+        </pc:sldMkLst>
+      </pc:sldChg>
+    </pc:docChg>
+  </pc:docChgLst>
+  <pc:docChgLst>
     <pc:chgData name="ANTONIO LANZA" userId="3bedaee3-2570-4681-af0c-a5cbe5fe9148" providerId="ADAL" clId="{3C80D2C2-3092-4E1E-960D-0A285D277E83}"/>
     <pc:docChg chg="undo custSel addSld delSld modSld sldOrd addMainMaster delMainMaster modMainMaster">
-      <pc:chgData name="ANTONIO LANZA" userId="3bedaee3-2570-4681-af0c-a5cbe5fe9148" providerId="ADAL" clId="{3C80D2C2-3092-4E1E-960D-0A285D277E83}" dt="2024-10-18T14:19:53.265" v="4302"/>
+      <pc:chgData name="ANTONIO LANZA" userId="3bedaee3-2570-4681-af0c-a5cbe5fe9148" providerId="ADAL" clId="{3C80D2C2-3092-4E1E-960D-0A285D277E83}" dt="2024-10-24T11:14:40.457" v="4311" actId="14100"/>
       <pc:docMkLst>
         <pc:docMk/>
       </pc:docMkLst>
@@ -340,7 +396,7 @@
         </pc:cxnChg>
       </pc:sldChg>
       <pc:sldChg chg="addSp delSp modSp new mod modTransition setBg modClrScheme chgLayout">
-        <pc:chgData name="ANTONIO LANZA" userId="3bedaee3-2570-4681-af0c-a5cbe5fe9148" providerId="ADAL" clId="{3C80D2C2-3092-4E1E-960D-0A285D277E83}" dt="2024-10-18T13:56:20.538" v="3791" actId="478"/>
+        <pc:chgData name="ANTONIO LANZA" userId="3bedaee3-2570-4681-af0c-a5cbe5fe9148" providerId="ADAL" clId="{3C80D2C2-3092-4E1E-960D-0A285D277E83}" dt="2024-10-22T16:14:47.526" v="4303" actId="14100"/>
         <pc:sldMkLst>
           <pc:docMk/>
           <pc:sldMk cId="2616788787" sldId="258"/>
@@ -418,7 +474,7 @@
           </ac:picMkLst>
         </pc:picChg>
         <pc:picChg chg="add del mod ord">
-          <ac:chgData name="ANTONIO LANZA" userId="3bedaee3-2570-4681-af0c-a5cbe5fe9148" providerId="ADAL" clId="{3C80D2C2-3092-4E1E-960D-0A285D277E83}" dt="2024-10-17T11:07:13.551" v="622" actId="14100"/>
+          <ac:chgData name="ANTONIO LANZA" userId="3bedaee3-2570-4681-af0c-a5cbe5fe9148" providerId="ADAL" clId="{3C80D2C2-3092-4E1E-960D-0A285D277E83}" dt="2024-10-22T16:14:47.526" v="4303" actId="14100"/>
           <ac:picMkLst>
             <pc:docMk/>
             <pc:sldMk cId="2616788787" sldId="258"/>
@@ -945,7 +1001,7 @@
         </pc:graphicFrameChg>
       </pc:sldChg>
       <pc:sldChg chg="addSp delSp modSp add mod ord setBg">
-        <pc:chgData name="ANTONIO LANZA" userId="3bedaee3-2570-4681-af0c-a5cbe5fe9148" providerId="ADAL" clId="{3C80D2C2-3092-4E1E-960D-0A285D277E83}" dt="2024-10-18T13:34:35.317" v="3564" actId="14100"/>
+        <pc:chgData name="ANTONIO LANZA" userId="3bedaee3-2570-4681-af0c-a5cbe5fe9148" providerId="ADAL" clId="{3C80D2C2-3092-4E1E-960D-0A285D277E83}" dt="2024-10-24T11:14:40.457" v="4311" actId="14100"/>
         <pc:sldMkLst>
           <pc:docMk/>
           <pc:sldMk cId="920878615" sldId="266"/>
@@ -1199,7 +1255,7 @@
           </ac:picMkLst>
         </pc:picChg>
         <pc:picChg chg="add mod modCrop">
-          <ac:chgData name="ANTONIO LANZA" userId="3bedaee3-2570-4681-af0c-a5cbe5fe9148" providerId="ADAL" clId="{3C80D2C2-3092-4E1E-960D-0A285D277E83}" dt="2024-10-18T13:34:35.317" v="3564" actId="14100"/>
+          <ac:chgData name="ANTONIO LANZA" userId="3bedaee3-2570-4681-af0c-a5cbe5fe9148" providerId="ADAL" clId="{3C80D2C2-3092-4E1E-960D-0A285D277E83}" dt="2024-10-24T11:14:40.457" v="4311" actId="14100"/>
           <ac:picMkLst>
             <pc:docMk/>
             <pc:sldMk cId="920878615" sldId="266"/>
@@ -6778,7 +6834,7 @@
   <dgm:whole/>
   <dgm:extLst>
     <a:ext uri="http://schemas.microsoft.com/office/drawing/2008/diagram">
-      <dsp:dataModelExt xmlns:dsp="http://schemas.microsoft.com/office/drawing/2008/diagram" relId="rId6" minVer="http://schemas.openxmlformats.org/drawingml/2006/diagram"/>
+      <dsp:dataModelExt xmlns:dsp="http://schemas.microsoft.com/office/drawing/2008/diagram" relId="rId7" minVer="http://schemas.openxmlformats.org/drawingml/2006/diagram"/>
     </a:ext>
   </dgm:extLst>
 </dgm:dataModel>
@@ -19818,7 +19874,7 @@
           <a:p>
             <a:fld id="{7B2AFD87-01E6-4970-A324-6A64645983EE}" type="datetimeFigureOut">
               <a:rPr lang="en-US" smtClean="0"/>
-              <a:t>10/18/2024</a:t>
+              <a:t>10/24/2024</a:t>
             </a:fld>
             <a:endParaRPr lang="en-US"/>
           </a:p>
@@ -20132,11 +20188,27 @@
           <a:p>
             <a:r>
               <a:rPr lang="en-US" dirty="0"/>
-              <a:t>Qui </a:t>
+              <a:t>Buongiorno a tutti, io </a:t>
             </a:r>
             <a:r>
               <a:rPr lang="en-US" dirty="0" err="1"/>
-              <a:t>potremmo</a:t>
+              <a:t>sono</a:t>
+            </a:r>
+            <a:r>
+              <a:rPr lang="en-US" dirty="0"/>
+              <a:t> Daniel Luca e </a:t>
+            </a:r>
+            <a:r>
+              <a:rPr lang="en-US" dirty="0" err="1"/>
+              <a:t>insieme</a:t>
+            </a:r>
+            <a:r>
+              <a:rPr lang="en-US" dirty="0"/>
+              <a:t> al </a:t>
+            </a:r>
+            <a:r>
+              <a:rPr lang="en-US" dirty="0" err="1"/>
+              <a:t>mio</a:t>
             </a:r>
             <a:r>
               <a:rPr lang="en-US" dirty="0"/>
@@ -20144,15 +20216,23 @@
             </a:r>
             <a:r>
               <a:rPr lang="en-US" dirty="0" err="1"/>
-              <a:t>parlare</a:t>
+              <a:t>collega</a:t>
             </a:r>
             <a:r>
               <a:rPr lang="en-US" dirty="0"/>
-              <a:t> di </a:t>
+              <a:t> Antonio Lanza vi </a:t>
             </a:r>
             <a:r>
               <a:rPr lang="en-US" dirty="0" err="1"/>
-              <a:t>cosa</a:t>
+              <a:t>andremo</a:t>
+            </a:r>
+            <a:r>
+              <a:rPr lang="en-US" dirty="0"/>
+              <a:t> ad </a:t>
+            </a:r>
+            <a:r>
+              <a:rPr lang="en-US" dirty="0" err="1"/>
+              <a:t>esporre</a:t>
             </a:r>
             <a:r>
               <a:rPr lang="en-US" dirty="0"/>
@@ -20160,23 +20240,15 @@
             </a:r>
             <a:r>
               <a:rPr lang="en-US" dirty="0" err="1"/>
-              <a:t>sono</a:t>
+              <a:t>questa</a:t>
             </a:r>
             <a:r>
               <a:rPr lang="en-US" dirty="0"/>
-              <a:t> arxiv.org e ar5iv.org e </a:t>
+              <a:t> breve </a:t>
             </a:r>
             <a:r>
               <a:rPr lang="en-US" dirty="0" err="1"/>
-              <a:t>spiegare</a:t>
-            </a:r>
-            <a:r>
-              <a:rPr lang="en-US" dirty="0"/>
-              <a:t> il </a:t>
-            </a:r>
-            <a:r>
-              <a:rPr lang="en-US" dirty="0" err="1"/>
-              <a:t>perchè</a:t>
+              <a:t>presentazione</a:t>
             </a:r>
             <a:r>
               <a:rPr lang="en-US" dirty="0"/>
@@ -20184,7 +20256,7 @@
             </a:r>
             <a:r>
               <a:rPr lang="en-US" dirty="0" err="1"/>
-              <a:t>necessitavamo</a:t>
+              <a:t>che</a:t>
             </a:r>
             <a:r>
               <a:rPr lang="en-US" dirty="0"/>
@@ -20192,20 +20264,259 @@
             </a:r>
             <a:r>
               <a:rPr lang="en-US" dirty="0" err="1"/>
+              <a:t>mostrerà</a:t>
+            </a:r>
+            <a:r>
+              <a:rPr lang="en-US" dirty="0"/>
+              <a:t> il nostro </a:t>
+            </a:r>
+            <a:r>
+              <a:rPr lang="en-US" dirty="0" err="1"/>
+              <a:t>svolgimento</a:t>
+            </a:r>
+            <a:r>
+              <a:rPr lang="en-US" dirty="0"/>
+              <a:t> del primo homework di </a:t>
+            </a:r>
+            <a:r>
+              <a:rPr lang="en-US" dirty="0" err="1"/>
+              <a:t>ingegneria</a:t>
+            </a:r>
+            <a:r>
+              <a:rPr lang="en-US" dirty="0"/>
+              <a:t> </a:t>
+            </a:r>
+            <a:r>
+              <a:rPr lang="en-US" dirty="0" err="1"/>
+              <a:t>dei</a:t>
+            </a:r>
+            <a:r>
+              <a:rPr lang="en-US" dirty="0"/>
+              <a:t> </a:t>
+            </a:r>
+            <a:r>
+              <a:rPr lang="en-US" dirty="0" err="1"/>
+              <a:t>dati</a:t>
+            </a:r>
+            <a:r>
+              <a:rPr lang="en-US" dirty="0"/>
+              <a:t> </a:t>
+            </a:r>
+            <a:r>
+              <a:rPr lang="en-US" dirty="0" err="1"/>
+              <a:t>assegnato</a:t>
+            </a:r>
+            <a:r>
+              <a:rPr lang="en-US" dirty="0"/>
+              <a:t> dal professor </a:t>
+            </a:r>
+            <a:r>
+              <a:rPr lang="en-US" dirty="0" err="1"/>
+              <a:t>Merialdo</a:t>
+            </a:r>
+            <a:r>
+              <a:rPr lang="en-US" dirty="0"/>
+              <a:t>.</a:t>
+            </a:r>
+          </a:p>
+          <a:p>
+            <a:r>
+              <a:rPr lang="en-US" i="0" dirty="0"/>
+              <a:t>Il </a:t>
+            </a:r>
+            <a:r>
+              <a:rPr lang="en-US" i="0" dirty="0" err="1"/>
+              <a:t>titolo</a:t>
+            </a:r>
+            <a:r>
+              <a:rPr lang="en-US" i="0" dirty="0"/>
+              <a:t> </a:t>
+            </a:r>
+            <a:r>
+              <a:rPr lang="en-US" i="0" dirty="0" err="1"/>
+              <a:t>che</a:t>
+            </a:r>
+            <a:r>
+              <a:rPr lang="en-US" i="0" dirty="0"/>
+              <a:t> </a:t>
+            </a:r>
+            <a:r>
+              <a:rPr lang="en-US" i="0" dirty="0" err="1"/>
+              <a:t>leggete</a:t>
+            </a:r>
+            <a:r>
+              <a:rPr lang="en-US" i="0" dirty="0"/>
+              <a:t> </a:t>
+            </a:r>
+            <a:r>
+              <a:rPr lang="en-US" i="0" dirty="0" err="1"/>
+              <a:t>sulla</a:t>
+            </a:r>
+            <a:r>
+              <a:rPr lang="en-US" i="0" dirty="0"/>
+              <a:t> slide </a:t>
+            </a:r>
+            <a:r>
+              <a:rPr lang="en-US" i="0" dirty="0" err="1"/>
+              <a:t>riassume</a:t>
+            </a:r>
+            <a:r>
+              <a:rPr lang="en-US" i="0" dirty="0"/>
+              <a:t> </a:t>
+            </a:r>
+            <a:r>
+              <a:rPr lang="en-US" i="0" dirty="0" err="1"/>
+              <a:t>l’attività</a:t>
+            </a:r>
+            <a:r>
+              <a:rPr lang="en-US" i="0" dirty="0"/>
+              <a:t> </a:t>
+            </a:r>
+            <a:r>
+              <a:rPr lang="en-US" i="0" dirty="0" err="1"/>
+              <a:t>principale</a:t>
+            </a:r>
+            <a:r>
+              <a:rPr lang="en-US" i="0" dirty="0"/>
+              <a:t> di tale </a:t>
+            </a:r>
+            <a:r>
+              <a:rPr lang="en-US" i="0" dirty="0" err="1"/>
+              <a:t>lavoro</a:t>
+            </a:r>
+            <a:r>
+              <a:rPr lang="en-US" i="0" dirty="0"/>
+              <a:t> (</a:t>
+            </a:r>
+            <a:r>
+              <a:rPr lang="en-US" i="0" dirty="0" err="1"/>
+              <a:t>l’obiettivo</a:t>
+            </a:r>
+            <a:r>
+              <a:rPr lang="en-US" i="0" dirty="0"/>
+              <a:t> se </a:t>
+            </a:r>
+            <a:r>
+              <a:rPr lang="en-US" i="0" dirty="0" err="1"/>
+              <a:t>vogliamo</a:t>
+            </a:r>
+            <a:r>
+              <a:rPr lang="en-US" i="0" dirty="0"/>
+              <a:t>), ma </a:t>
+            </a:r>
+            <a:r>
+              <a:rPr lang="en-US" i="0" dirty="0" err="1"/>
+              <a:t>andiamo</a:t>
+            </a:r>
+            <a:r>
+              <a:rPr lang="en-US" i="0" dirty="0"/>
+              <a:t> con </a:t>
+            </a:r>
+            <a:r>
+              <a:rPr lang="en-US" i="0" dirty="0" err="1"/>
+              <a:t>ordine</a:t>
+            </a:r>
+            <a:r>
+              <a:rPr lang="en-US" i="0" dirty="0"/>
+              <a:t> </a:t>
+            </a:r>
+            <a:r>
+              <a:rPr lang="en-US" i="0" dirty="0" err="1"/>
+              <a:t>elencando</a:t>
+            </a:r>
+            <a:r>
+              <a:rPr lang="en-US" i="0" dirty="0"/>
+              <a:t> </a:t>
+            </a:r>
+            <a:r>
+              <a:rPr lang="en-US" i="0" dirty="0" err="1"/>
               <a:t>i</a:t>
             </a:r>
             <a:r>
-              <a:rPr lang="en-US" dirty="0"/>
-              <a:t> file in </a:t>
-            </a:r>
-            <a:r>
-              <a:rPr lang="en-US" dirty="0" err="1"/>
-              <a:t>formato</a:t>
-            </a:r>
-            <a:r>
-              <a:rPr lang="en-US" dirty="0"/>
-              <a:t> html</a:t>
-            </a:r>
+              <a:rPr lang="en-US" i="0" dirty="0"/>
+              <a:t> </a:t>
+            </a:r>
+            <a:r>
+              <a:rPr lang="en-US" i="0" dirty="0" err="1"/>
+              <a:t>tre</a:t>
+            </a:r>
+            <a:r>
+              <a:rPr lang="en-US" i="0" dirty="0"/>
+              <a:t> </a:t>
+            </a:r>
+            <a:r>
+              <a:rPr lang="en-US" i="0" dirty="0" err="1"/>
+              <a:t>principali</a:t>
+            </a:r>
+            <a:r>
+              <a:rPr lang="en-US" i="0" dirty="0"/>
+              <a:t> step, da </a:t>
+            </a:r>
+            <a:r>
+              <a:rPr lang="en-US" i="0" dirty="0" err="1"/>
+              <a:t>noi</a:t>
+            </a:r>
+            <a:r>
+              <a:rPr lang="en-US" i="0" dirty="0"/>
+              <a:t> </a:t>
+            </a:r>
+            <a:r>
+              <a:rPr lang="en-US" i="0" dirty="0" err="1"/>
+              <a:t>individuati</a:t>
+            </a:r>
+            <a:r>
+              <a:rPr lang="en-US" i="0" dirty="0"/>
+              <a:t>, </a:t>
+            </a:r>
+            <a:r>
+              <a:rPr lang="en-US" i="0" dirty="0" err="1"/>
+              <a:t>che</a:t>
+            </a:r>
+            <a:r>
+              <a:rPr lang="en-US" i="0" dirty="0"/>
+              <a:t> </a:t>
+            </a:r>
+            <a:r>
+              <a:rPr lang="en-US" i="0" dirty="0" err="1"/>
+              <a:t>sono</a:t>
+            </a:r>
+            <a:r>
+              <a:rPr lang="en-US" i="0" dirty="0"/>
+              <a:t> </a:t>
+            </a:r>
+            <a:r>
+              <a:rPr lang="en-US" i="0" dirty="0" err="1"/>
+              <a:t>stati</a:t>
+            </a:r>
+            <a:r>
+              <a:rPr lang="en-US" i="0" dirty="0"/>
+              <a:t> </a:t>
+            </a:r>
+            <a:r>
+              <a:rPr lang="en-US" i="0" dirty="0" err="1"/>
+              <a:t>necessari</a:t>
+            </a:r>
+            <a:r>
+              <a:rPr lang="en-US" i="0" dirty="0"/>
+              <a:t> per </a:t>
+            </a:r>
+            <a:r>
+              <a:rPr lang="en-US" i="0" dirty="0" err="1"/>
+              <a:t>completare</a:t>
+            </a:r>
+            <a:r>
+              <a:rPr lang="en-US" i="0" dirty="0"/>
+              <a:t> </a:t>
+            </a:r>
+            <a:r>
+              <a:rPr lang="en-US" i="0" dirty="0" err="1"/>
+              <a:t>l’homework</a:t>
+            </a:r>
+            <a:r>
+              <a:rPr lang="en-US" i="0" dirty="0"/>
+              <a:t>:</a:t>
+            </a:r>
+            <a:endParaRPr lang="en-US" dirty="0"/>
           </a:p>
         </p:txBody>
       </p:sp>
@@ -20226,7 +20537,7 @@
           <a:p>
             <a:fld id="{7BE15B25-EFB2-474E-9B32-D94DD9C86BA1}" type="slidenum">
               <a:rPr lang="en-US" smtClean="0"/>
-              <a:t>4</a:t>
+              <a:t>1</a:t>
             </a:fld>
             <a:endParaRPr lang="en-US"/>
           </a:p>
@@ -20235,7 +20546,7 @@
     </p:spTree>
     <p:extLst>
       <p:ext uri="{BB962C8B-B14F-4D97-AF65-F5344CB8AC3E}">
-        <p14:creationId xmlns:p14="http://schemas.microsoft.com/office/powerpoint/2010/main" val="874458869"/>
+        <p14:creationId xmlns:p14="http://schemas.microsoft.com/office/powerpoint/2010/main" val="3774927599"/>
       </p:ext>
     </p:extLst>
   </p:cSld>
@@ -20369,6 +20680,578 @@
           <a:p>
             <a:fld id="{7BE15B25-EFB2-474E-9B32-D94DD9C86BA1}" type="slidenum">
               <a:rPr lang="en-US" smtClean="0"/>
+              <a:t>10</a:t>
+            </a:fld>
+            <a:endParaRPr lang="en-US"/>
+          </a:p>
+        </p:txBody>
+      </p:sp>
+    </p:spTree>
+    <p:extLst>
+      <p:ext uri="{BB962C8B-B14F-4D97-AF65-F5344CB8AC3E}">
+        <p14:creationId xmlns:p14="http://schemas.microsoft.com/office/powerpoint/2010/main" val="1829218800"/>
+      </p:ext>
+    </p:extLst>
+  </p:cSld>
+  <p:clrMapOvr>
+    <a:masterClrMapping/>
+  </p:clrMapOvr>
+</p:notes>
+</file>
+
+<file path=ppt/notesSlides/notesSlide11.xml><?xml version="1.0" encoding="utf-8"?>
+<p:notes xmlns:a="http://schemas.openxmlformats.org/drawingml/2006/main" xmlns:r="http://schemas.openxmlformats.org/officeDocument/2006/relationships" xmlns:p="http://schemas.openxmlformats.org/presentationml/2006/main">
+  <p:cSld>
+    <p:spTree>
+      <p:nvGrpSpPr>
+        <p:cNvPr id="1" name=""/>
+        <p:cNvGrpSpPr/>
+        <p:nvPr/>
+      </p:nvGrpSpPr>
+      <p:grpSpPr>
+        <a:xfrm>
+          <a:off x="0" y="0"/>
+          <a:ext cx="0" cy="0"/>
+          <a:chOff x="0" y="0"/>
+          <a:chExt cx="0" cy="0"/>
+        </a:xfrm>
+      </p:grpSpPr>
+      <p:sp>
+        <p:nvSpPr>
+          <p:cNvPr id="2" name="Segnaposto immagine diapositiva 1"/>
+          <p:cNvSpPr>
+            <a:spLocks noGrp="1" noRot="1" noChangeAspect="1"/>
+          </p:cNvSpPr>
+          <p:nvPr>
+            <p:ph type="sldImg"/>
+          </p:nvPr>
+        </p:nvSpPr>
+        <p:spPr/>
+      </p:sp>
+      <p:sp>
+        <p:nvSpPr>
+          <p:cNvPr id="3" name="Segnaposto note 2"/>
+          <p:cNvSpPr>
+            <a:spLocks noGrp="1"/>
+          </p:cNvSpPr>
+          <p:nvPr>
+            <p:ph type="body" idx="1"/>
+          </p:nvPr>
+        </p:nvSpPr>
+        <p:spPr/>
+        <p:txBody>
+          <a:bodyPr/>
+          <a:lstStyle/>
+          <a:p>
+            <a:r>
+              <a:rPr lang="en-US" dirty="0"/>
+              <a:t>XSL(</a:t>
+            </a:r>
+            <a:r>
+              <a:rPr lang="en-US" dirty="0" err="1"/>
+              <a:t>eXtensible</a:t>
+            </a:r>
+            <a:r>
+              <a:rPr lang="en-US" dirty="0"/>
+              <a:t> Stylesheet Language) </a:t>
+            </a:r>
+            <a:r>
+              <a:rPr lang="en-US" dirty="0" err="1"/>
+              <a:t>permette</a:t>
+            </a:r>
+            <a:r>
+              <a:rPr lang="en-US" dirty="0"/>
+              <a:t> di </a:t>
+            </a:r>
+            <a:r>
+              <a:rPr lang="en-US" dirty="0" err="1"/>
+              <a:t>visualizzare</a:t>
+            </a:r>
+            <a:r>
+              <a:rPr lang="en-US" dirty="0"/>
+              <a:t> lo </a:t>
+            </a:r>
+            <a:r>
+              <a:rPr lang="en-US" dirty="0" err="1"/>
+              <a:t>stesso</a:t>
+            </a:r>
+            <a:r>
+              <a:rPr lang="en-US" dirty="0"/>
+              <a:t> </a:t>
+            </a:r>
+            <a:r>
+              <a:rPr lang="en-US" dirty="0" err="1"/>
+              <a:t>documento</a:t>
+            </a:r>
+            <a:r>
+              <a:rPr lang="en-US" dirty="0"/>
+              <a:t> XML in </a:t>
+            </a:r>
+            <a:r>
+              <a:rPr lang="en-US" dirty="0" err="1"/>
+              <a:t>formati</a:t>
+            </a:r>
+            <a:r>
+              <a:rPr lang="en-US" dirty="0"/>
+              <a:t> </a:t>
+            </a:r>
+            <a:r>
+              <a:rPr lang="en-US" dirty="0" err="1"/>
+              <a:t>diversi</a:t>
+            </a:r>
+            <a:r>
+              <a:rPr lang="en-US" dirty="0"/>
+              <a:t> </a:t>
+            </a:r>
+          </a:p>
+        </p:txBody>
+      </p:sp>
+      <p:sp>
+        <p:nvSpPr>
+          <p:cNvPr id="4" name="Segnaposto numero diapositiva 3"/>
+          <p:cNvSpPr>
+            <a:spLocks noGrp="1"/>
+          </p:cNvSpPr>
+          <p:nvPr>
+            <p:ph type="sldNum" sz="quarter" idx="5"/>
+          </p:nvPr>
+        </p:nvSpPr>
+        <p:spPr/>
+        <p:txBody>
+          <a:bodyPr/>
+          <a:lstStyle/>
+          <a:p>
+            <a:fld id="{7BE15B25-EFB2-474E-9B32-D94DD9C86BA1}" type="slidenum">
+              <a:rPr lang="en-US" smtClean="0"/>
+              <a:t>11</a:t>
+            </a:fld>
+            <a:endParaRPr lang="en-US"/>
+          </a:p>
+        </p:txBody>
+      </p:sp>
+    </p:spTree>
+    <p:extLst>
+      <p:ext uri="{BB962C8B-B14F-4D97-AF65-F5344CB8AC3E}">
+        <p14:creationId xmlns:p14="http://schemas.microsoft.com/office/powerpoint/2010/main" val="295850280"/>
+      </p:ext>
+    </p:extLst>
+  </p:cSld>
+  <p:clrMapOvr>
+    <a:masterClrMapping/>
+  </p:clrMapOvr>
+</p:notes>
+</file>
+
+<file path=ppt/notesSlides/notesSlide12.xml><?xml version="1.0" encoding="utf-8"?>
+<p:notes xmlns:a="http://schemas.openxmlformats.org/drawingml/2006/main" xmlns:r="http://schemas.openxmlformats.org/officeDocument/2006/relationships" xmlns:p="http://schemas.openxmlformats.org/presentationml/2006/main">
+  <p:cSld>
+    <p:spTree>
+      <p:nvGrpSpPr>
+        <p:cNvPr id="1" name=""/>
+        <p:cNvGrpSpPr/>
+        <p:nvPr/>
+      </p:nvGrpSpPr>
+      <p:grpSpPr>
+        <a:xfrm>
+          <a:off x="0" y="0"/>
+          <a:ext cx="0" cy="0"/>
+          <a:chOff x="0" y="0"/>
+          <a:chExt cx="0" cy="0"/>
+        </a:xfrm>
+      </p:grpSpPr>
+      <p:sp>
+        <p:nvSpPr>
+          <p:cNvPr id="2" name="Segnaposto immagine diapositiva 1"/>
+          <p:cNvSpPr>
+            <a:spLocks noGrp="1" noRot="1" noChangeAspect="1"/>
+          </p:cNvSpPr>
+          <p:nvPr>
+            <p:ph type="sldImg"/>
+          </p:nvPr>
+        </p:nvSpPr>
+        <p:spPr/>
+      </p:sp>
+      <p:sp>
+        <p:nvSpPr>
+          <p:cNvPr id="3" name="Segnaposto note 2"/>
+          <p:cNvSpPr>
+            <a:spLocks noGrp="1"/>
+          </p:cNvSpPr>
+          <p:nvPr>
+            <p:ph type="body" idx="1"/>
+          </p:nvPr>
+        </p:nvSpPr>
+        <p:spPr/>
+        <p:txBody>
+          <a:bodyPr/>
+          <a:lstStyle/>
+          <a:p>
+            <a:r>
+              <a:rPr lang="en-US" dirty="0"/>
+              <a:t>XSL(</a:t>
+            </a:r>
+            <a:r>
+              <a:rPr lang="en-US" dirty="0" err="1"/>
+              <a:t>eXtensible</a:t>
+            </a:r>
+            <a:r>
+              <a:rPr lang="en-US" dirty="0"/>
+              <a:t> Stylesheet Language) </a:t>
+            </a:r>
+            <a:r>
+              <a:rPr lang="en-US" dirty="0" err="1"/>
+              <a:t>permette</a:t>
+            </a:r>
+            <a:r>
+              <a:rPr lang="en-US" dirty="0"/>
+              <a:t> di </a:t>
+            </a:r>
+            <a:r>
+              <a:rPr lang="en-US" dirty="0" err="1"/>
+              <a:t>visualizzare</a:t>
+            </a:r>
+            <a:r>
+              <a:rPr lang="en-US" dirty="0"/>
+              <a:t> lo </a:t>
+            </a:r>
+            <a:r>
+              <a:rPr lang="en-US" dirty="0" err="1"/>
+              <a:t>stesso</a:t>
+            </a:r>
+            <a:r>
+              <a:rPr lang="en-US" dirty="0"/>
+              <a:t> </a:t>
+            </a:r>
+            <a:r>
+              <a:rPr lang="en-US" dirty="0" err="1"/>
+              <a:t>documento</a:t>
+            </a:r>
+            <a:r>
+              <a:rPr lang="en-US" dirty="0"/>
+              <a:t> XML in </a:t>
+            </a:r>
+            <a:r>
+              <a:rPr lang="en-US" dirty="0" err="1"/>
+              <a:t>formati</a:t>
+            </a:r>
+            <a:r>
+              <a:rPr lang="en-US" dirty="0"/>
+              <a:t> </a:t>
+            </a:r>
+            <a:r>
+              <a:rPr lang="en-US" dirty="0" err="1"/>
+              <a:t>diversi</a:t>
+            </a:r>
+            <a:r>
+              <a:rPr lang="en-US" dirty="0"/>
+              <a:t> </a:t>
+            </a:r>
+          </a:p>
+        </p:txBody>
+      </p:sp>
+      <p:sp>
+        <p:nvSpPr>
+          <p:cNvPr id="4" name="Segnaposto numero diapositiva 3"/>
+          <p:cNvSpPr>
+            <a:spLocks noGrp="1"/>
+          </p:cNvSpPr>
+          <p:nvPr>
+            <p:ph type="sldNum" sz="quarter" idx="5"/>
+          </p:nvPr>
+        </p:nvSpPr>
+        <p:spPr/>
+        <p:txBody>
+          <a:bodyPr/>
+          <a:lstStyle/>
+          <a:p>
+            <a:fld id="{7BE15B25-EFB2-474E-9B32-D94DD9C86BA1}" type="slidenum">
+              <a:rPr lang="en-US" smtClean="0"/>
+              <a:t>12</a:t>
+            </a:fld>
+            <a:endParaRPr lang="en-US"/>
+          </a:p>
+        </p:txBody>
+      </p:sp>
+    </p:spTree>
+    <p:extLst>
+      <p:ext uri="{BB962C8B-B14F-4D97-AF65-F5344CB8AC3E}">
+        <p14:creationId xmlns:p14="http://schemas.microsoft.com/office/powerpoint/2010/main" val="428625984"/>
+      </p:ext>
+    </p:extLst>
+  </p:cSld>
+  <p:clrMapOvr>
+    <a:masterClrMapping/>
+  </p:clrMapOvr>
+</p:notes>
+</file>
+
+<file path=ppt/notesSlides/notesSlide13.xml><?xml version="1.0" encoding="utf-8"?>
+<p:notes xmlns:a="http://schemas.openxmlformats.org/drawingml/2006/main" xmlns:r="http://schemas.openxmlformats.org/officeDocument/2006/relationships" xmlns:p="http://schemas.openxmlformats.org/presentationml/2006/main">
+  <p:cSld>
+    <p:spTree>
+      <p:nvGrpSpPr>
+        <p:cNvPr id="1" name=""/>
+        <p:cNvGrpSpPr/>
+        <p:nvPr/>
+      </p:nvGrpSpPr>
+      <p:grpSpPr>
+        <a:xfrm>
+          <a:off x="0" y="0"/>
+          <a:ext cx="0" cy="0"/>
+          <a:chOff x="0" y="0"/>
+          <a:chExt cx="0" cy="0"/>
+        </a:xfrm>
+      </p:grpSpPr>
+      <p:sp>
+        <p:nvSpPr>
+          <p:cNvPr id="2" name="Segnaposto immagine diapositiva 1"/>
+          <p:cNvSpPr>
+            <a:spLocks noGrp="1" noRot="1" noChangeAspect="1"/>
+          </p:cNvSpPr>
+          <p:nvPr>
+            <p:ph type="sldImg"/>
+          </p:nvPr>
+        </p:nvSpPr>
+        <p:spPr/>
+      </p:sp>
+      <p:sp>
+        <p:nvSpPr>
+          <p:cNvPr id="3" name="Segnaposto note 2"/>
+          <p:cNvSpPr>
+            <a:spLocks noGrp="1"/>
+          </p:cNvSpPr>
+          <p:nvPr>
+            <p:ph type="body" idx="1"/>
+          </p:nvPr>
+        </p:nvSpPr>
+        <p:spPr/>
+        <p:txBody>
+          <a:bodyPr/>
+          <a:lstStyle/>
+          <a:p>
+            <a:r>
+              <a:rPr lang="en-US" dirty="0"/>
+              <a:t>XSL(</a:t>
+            </a:r>
+            <a:r>
+              <a:rPr lang="en-US" dirty="0" err="1"/>
+              <a:t>eXtensible</a:t>
+            </a:r>
+            <a:r>
+              <a:rPr lang="en-US" dirty="0"/>
+              <a:t> Stylesheet Language) </a:t>
+            </a:r>
+            <a:r>
+              <a:rPr lang="en-US" dirty="0" err="1"/>
+              <a:t>permette</a:t>
+            </a:r>
+            <a:r>
+              <a:rPr lang="en-US" dirty="0"/>
+              <a:t> di </a:t>
+            </a:r>
+            <a:r>
+              <a:rPr lang="en-US" dirty="0" err="1"/>
+              <a:t>visualizzare</a:t>
+            </a:r>
+            <a:r>
+              <a:rPr lang="en-US" dirty="0"/>
+              <a:t> lo </a:t>
+            </a:r>
+            <a:r>
+              <a:rPr lang="en-US" dirty="0" err="1"/>
+              <a:t>stesso</a:t>
+            </a:r>
+            <a:r>
+              <a:rPr lang="en-US" dirty="0"/>
+              <a:t> </a:t>
+            </a:r>
+            <a:r>
+              <a:rPr lang="en-US" dirty="0" err="1"/>
+              <a:t>documento</a:t>
+            </a:r>
+            <a:r>
+              <a:rPr lang="en-US" dirty="0"/>
+              <a:t> XML in </a:t>
+            </a:r>
+            <a:r>
+              <a:rPr lang="en-US" dirty="0" err="1"/>
+              <a:t>formati</a:t>
+            </a:r>
+            <a:r>
+              <a:rPr lang="en-US" dirty="0"/>
+              <a:t> </a:t>
+            </a:r>
+            <a:r>
+              <a:rPr lang="en-US" dirty="0" err="1"/>
+              <a:t>diversi</a:t>
+            </a:r>
+            <a:r>
+              <a:rPr lang="en-US" dirty="0"/>
+              <a:t> </a:t>
+            </a:r>
+          </a:p>
+        </p:txBody>
+      </p:sp>
+      <p:sp>
+        <p:nvSpPr>
+          <p:cNvPr id="4" name="Segnaposto numero diapositiva 3"/>
+          <p:cNvSpPr>
+            <a:spLocks noGrp="1"/>
+          </p:cNvSpPr>
+          <p:nvPr>
+            <p:ph type="sldNum" sz="quarter" idx="5"/>
+          </p:nvPr>
+        </p:nvSpPr>
+        <p:spPr/>
+        <p:txBody>
+          <a:bodyPr/>
+          <a:lstStyle/>
+          <a:p>
+            <a:fld id="{7BE15B25-EFB2-474E-9B32-D94DD9C86BA1}" type="slidenum">
+              <a:rPr lang="en-US" smtClean="0"/>
+              <a:t>13</a:t>
+            </a:fld>
+            <a:endParaRPr lang="en-US"/>
+          </a:p>
+        </p:txBody>
+      </p:sp>
+    </p:spTree>
+    <p:extLst>
+      <p:ext uri="{BB962C8B-B14F-4D97-AF65-F5344CB8AC3E}">
+        <p14:creationId xmlns:p14="http://schemas.microsoft.com/office/powerpoint/2010/main" val="438507635"/>
+      </p:ext>
+    </p:extLst>
+  </p:cSld>
+  <p:clrMapOvr>
+    <a:masterClrMapping/>
+  </p:clrMapOvr>
+</p:notes>
+</file>
+
+<file path=ppt/notesSlides/notesSlide14.xml><?xml version="1.0" encoding="utf-8"?>
+<p:notes xmlns:a="http://schemas.openxmlformats.org/drawingml/2006/main" xmlns:r="http://schemas.openxmlformats.org/officeDocument/2006/relationships" xmlns:p="http://schemas.openxmlformats.org/presentationml/2006/main">
+  <p:cSld>
+    <p:spTree>
+      <p:nvGrpSpPr>
+        <p:cNvPr id="1" name=""/>
+        <p:cNvGrpSpPr/>
+        <p:nvPr/>
+      </p:nvGrpSpPr>
+      <p:grpSpPr>
+        <a:xfrm>
+          <a:off x="0" y="0"/>
+          <a:ext cx="0" cy="0"/>
+          <a:chOff x="0" y="0"/>
+          <a:chExt cx="0" cy="0"/>
+        </a:xfrm>
+      </p:grpSpPr>
+      <p:sp>
+        <p:nvSpPr>
+          <p:cNvPr id="2" name="Segnaposto immagine diapositiva 1"/>
+          <p:cNvSpPr>
+            <a:spLocks noGrp="1" noRot="1" noChangeAspect="1"/>
+          </p:cNvSpPr>
+          <p:nvPr>
+            <p:ph type="sldImg"/>
+          </p:nvPr>
+        </p:nvSpPr>
+        <p:spPr/>
+      </p:sp>
+      <p:sp>
+        <p:nvSpPr>
+          <p:cNvPr id="3" name="Segnaposto note 2"/>
+          <p:cNvSpPr>
+            <a:spLocks noGrp="1"/>
+          </p:cNvSpPr>
+          <p:nvPr>
+            <p:ph type="body" idx="1"/>
+          </p:nvPr>
+        </p:nvSpPr>
+        <p:spPr/>
+        <p:txBody>
+          <a:bodyPr/>
+          <a:lstStyle/>
+          <a:p>
+            <a:r>
+              <a:rPr lang="en-US" dirty="0"/>
+              <a:t>XSL(</a:t>
+            </a:r>
+            <a:r>
+              <a:rPr lang="en-US" dirty="0" err="1"/>
+              <a:t>eXtensible</a:t>
+            </a:r>
+            <a:r>
+              <a:rPr lang="en-US" dirty="0"/>
+              <a:t> Stylesheet Language) </a:t>
+            </a:r>
+            <a:r>
+              <a:rPr lang="en-US" dirty="0" err="1"/>
+              <a:t>permette</a:t>
+            </a:r>
+            <a:r>
+              <a:rPr lang="en-US" dirty="0"/>
+              <a:t> di </a:t>
+            </a:r>
+            <a:r>
+              <a:rPr lang="en-US" dirty="0" err="1"/>
+              <a:t>visualizzare</a:t>
+            </a:r>
+            <a:r>
+              <a:rPr lang="en-US" dirty="0"/>
+              <a:t> lo </a:t>
+            </a:r>
+            <a:r>
+              <a:rPr lang="en-US" dirty="0" err="1"/>
+              <a:t>stesso</a:t>
+            </a:r>
+            <a:r>
+              <a:rPr lang="en-US" dirty="0"/>
+              <a:t> </a:t>
+            </a:r>
+            <a:r>
+              <a:rPr lang="en-US" dirty="0" err="1"/>
+              <a:t>documento</a:t>
+            </a:r>
+            <a:r>
+              <a:rPr lang="en-US" dirty="0"/>
+              <a:t> XML in </a:t>
+            </a:r>
+            <a:r>
+              <a:rPr lang="en-US" dirty="0" err="1"/>
+              <a:t>formati</a:t>
+            </a:r>
+            <a:r>
+              <a:rPr lang="en-US" dirty="0"/>
+              <a:t> </a:t>
+            </a:r>
+            <a:r>
+              <a:rPr lang="en-US" dirty="0" err="1"/>
+              <a:t>diversi</a:t>
+            </a:r>
+            <a:r>
+              <a:rPr lang="en-US" dirty="0"/>
+              <a:t> </a:t>
+            </a:r>
+          </a:p>
+        </p:txBody>
+      </p:sp>
+      <p:sp>
+        <p:nvSpPr>
+          <p:cNvPr id="4" name="Segnaposto numero diapositiva 3"/>
+          <p:cNvSpPr>
+            <a:spLocks noGrp="1"/>
+          </p:cNvSpPr>
+          <p:nvPr>
+            <p:ph type="sldNum" sz="quarter" idx="5"/>
+          </p:nvPr>
+        </p:nvSpPr>
+        <p:spPr/>
+        <p:txBody>
+          <a:bodyPr/>
+          <a:lstStyle/>
+          <a:p>
+            <a:fld id="{7BE15B25-EFB2-474E-9B32-D94DD9C86BA1}" type="slidenum">
+              <a:rPr lang="en-US" smtClean="0"/>
               <a:t>14</a:t>
             </a:fld>
             <a:endParaRPr lang="en-US"/>
@@ -20388,7 +21271,7 @@
 </p:notes>
 </file>
 
-<file path=ppt/notesSlides/notesSlide11.xml><?xml version="1.0" encoding="utf-8"?>
+<file path=ppt/notesSlides/notesSlide15.xml><?xml version="1.0" encoding="utf-8"?>
 <p:notes xmlns:a="http://schemas.openxmlformats.org/drawingml/2006/main" xmlns:r="http://schemas.openxmlformats.org/officeDocument/2006/relationships" xmlns:p="http://schemas.openxmlformats.org/presentationml/2006/main">
   <p:cSld>
     <p:spTree>
@@ -20577,11 +21460,19 @@
           <a:p>
             <a:r>
               <a:rPr lang="en-US" dirty="0"/>
-              <a:t>Qui a voce </a:t>
+              <a:t>1)Il primo </a:t>
             </a:r>
             <a:r>
               <a:rPr lang="en-US" dirty="0" err="1"/>
-              <a:t>descriviamo</a:t>
+              <a:t>passo</a:t>
+            </a:r>
+            <a:r>
+              <a:rPr lang="en-US" dirty="0"/>
+              <a:t> è </a:t>
+            </a:r>
+            <a:r>
+              <a:rPr lang="en-US" dirty="0" err="1"/>
+              <a:t>consistito</a:t>
             </a:r>
             <a:r>
               <a:rPr lang="en-US" dirty="0"/>
@@ -20589,17 +21480,336 @@
             </a:r>
             <a:r>
               <a:rPr lang="en-US" dirty="0" err="1"/>
-              <a:t>meglio</a:t>
+              <a:t>nello</a:t>
             </a:r>
             <a:r>
               <a:rPr lang="en-US" dirty="0"/>
-              <a:t> il </a:t>
+              <a:t> </a:t>
             </a:r>
             <a:r>
               <a:rPr lang="en-US" dirty="0" err="1"/>
-              <a:t>codice</a:t>
-            </a:r>
-            <a:endParaRPr lang="en-US" dirty="0"/>
+              <a:t>scegliere</a:t>
+            </a:r>
+            <a:r>
+              <a:rPr lang="en-US" dirty="0"/>
+              <a:t> un </a:t>
+            </a:r>
+            <a:r>
+              <a:rPr lang="en-US" dirty="0" err="1"/>
+              <a:t>argomento</a:t>
+            </a:r>
+            <a:r>
+              <a:rPr lang="en-US" dirty="0"/>
+              <a:t> </a:t>
+            </a:r>
+            <a:r>
+              <a:rPr lang="en-US" dirty="0" err="1"/>
+              <a:t>tra</a:t>
+            </a:r>
+            <a:r>
+              <a:rPr lang="en-US" dirty="0"/>
+              <a:t> </a:t>
+            </a:r>
+            <a:r>
+              <a:rPr lang="en-US" dirty="0" err="1"/>
+              <a:t>quelli</a:t>
+            </a:r>
+            <a:r>
+              <a:rPr lang="en-US" dirty="0"/>
+              <a:t> </a:t>
+            </a:r>
+            <a:r>
+              <a:rPr lang="en-US" dirty="0" err="1"/>
+              <a:t>proposti</a:t>
+            </a:r>
+            <a:r>
+              <a:rPr lang="en-US" dirty="0"/>
+              <a:t> dal prof e </a:t>
+            </a:r>
+            <a:r>
+              <a:rPr lang="en-US" dirty="0" err="1"/>
+              <a:t>scaricare</a:t>
+            </a:r>
+            <a:r>
+              <a:rPr lang="en-US" dirty="0"/>
+              <a:t> </a:t>
+            </a:r>
+            <a:r>
+              <a:rPr lang="en-US" dirty="0" err="1"/>
+              <a:t>almeno</a:t>
+            </a:r>
+            <a:r>
+              <a:rPr lang="en-US" dirty="0"/>
+              <a:t> 300 papers in </a:t>
+            </a:r>
+            <a:r>
+              <a:rPr lang="en-US" dirty="0" err="1"/>
+              <a:t>formato</a:t>
+            </a:r>
+            <a:r>
+              <a:rPr lang="en-US" dirty="0"/>
+              <a:t> html </a:t>
+            </a:r>
+            <a:r>
+              <a:rPr lang="en-US" dirty="0" err="1"/>
+              <a:t>riguardanti</a:t>
+            </a:r>
+            <a:r>
+              <a:rPr lang="en-US" dirty="0"/>
+              <a:t> tale </a:t>
+            </a:r>
+            <a:r>
+              <a:rPr lang="en-US" dirty="0" err="1"/>
+              <a:t>argomento</a:t>
+            </a:r>
+            <a:r>
+              <a:rPr lang="en-US" dirty="0"/>
+              <a:t>.</a:t>
+            </a:r>
+          </a:p>
+          <a:p>
+            <a:r>
+              <a:rPr lang="en-US" dirty="0"/>
+              <a:t>2)Il secondo </a:t>
+            </a:r>
+            <a:r>
+              <a:rPr lang="en-US" dirty="0" err="1"/>
+              <a:t>passo</a:t>
+            </a:r>
+            <a:r>
+              <a:rPr lang="en-US" dirty="0"/>
+              <a:t> ci ha </a:t>
+            </a:r>
+            <a:r>
+              <a:rPr lang="en-US" dirty="0" err="1"/>
+              <a:t>visti</a:t>
+            </a:r>
+            <a:r>
+              <a:rPr lang="en-US" dirty="0"/>
+              <a:t> </a:t>
+            </a:r>
+            <a:r>
+              <a:rPr lang="en-US" dirty="0" err="1"/>
+              <a:t>impegnati</a:t>
+            </a:r>
+            <a:r>
+              <a:rPr lang="en-US" dirty="0"/>
+              <a:t> </a:t>
+            </a:r>
+            <a:r>
+              <a:rPr lang="en-US" dirty="0" err="1"/>
+              <a:t>nella</a:t>
+            </a:r>
+            <a:r>
+              <a:rPr lang="en-US" dirty="0"/>
+              <a:t> </a:t>
+            </a:r>
+            <a:r>
+              <a:rPr lang="en-US" dirty="0" err="1"/>
+              <a:t>estrazione</a:t>
+            </a:r>
+            <a:r>
+              <a:rPr lang="en-US" dirty="0"/>
+              <a:t> di tutte le </a:t>
+            </a:r>
+            <a:r>
+              <a:rPr lang="en-US" dirty="0" err="1"/>
+              <a:t>tabelle</a:t>
+            </a:r>
+            <a:r>
+              <a:rPr lang="en-US" dirty="0"/>
+              <a:t> </a:t>
+            </a:r>
+            <a:r>
+              <a:rPr lang="en-US" dirty="0" err="1"/>
+              <a:t>dai</a:t>
+            </a:r>
+            <a:r>
+              <a:rPr lang="en-US" dirty="0"/>
+              <a:t> </a:t>
+            </a:r>
+            <a:r>
+              <a:rPr lang="en-US" dirty="0" err="1"/>
+              <a:t>suddetti</a:t>
+            </a:r>
+            <a:r>
+              <a:rPr lang="en-US" dirty="0"/>
+              <a:t> papers e </a:t>
+            </a:r>
+            <a:r>
+              <a:rPr lang="en-US" dirty="0" err="1"/>
+              <a:t>nella</a:t>
+            </a:r>
+            <a:r>
+              <a:rPr lang="en-US" dirty="0"/>
+              <a:t> successive </a:t>
+            </a:r>
+            <a:r>
+              <a:rPr lang="en-US" dirty="0" err="1"/>
+              <a:t>realizzazione</a:t>
+            </a:r>
+            <a:r>
+              <a:rPr lang="en-US" dirty="0"/>
+              <a:t> di file </a:t>
+            </a:r>
+            <a:r>
+              <a:rPr lang="en-US" dirty="0" err="1"/>
+              <a:t>json</a:t>
+            </a:r>
+            <a:r>
+              <a:rPr lang="en-US" dirty="0"/>
+              <a:t> </a:t>
+            </a:r>
+            <a:r>
+              <a:rPr lang="en-US" dirty="0" err="1"/>
+              <a:t>contenenenti</a:t>
+            </a:r>
+            <a:r>
+              <a:rPr lang="en-US" dirty="0"/>
+              <a:t> </a:t>
+            </a:r>
+            <a:r>
+              <a:rPr lang="en-US" dirty="0" err="1"/>
+              <a:t>alcune</a:t>
+            </a:r>
+            <a:r>
+              <a:rPr lang="en-US" dirty="0"/>
+              <a:t> </a:t>
+            </a:r>
+            <a:r>
+              <a:rPr lang="en-US" dirty="0" err="1"/>
+              <a:t>informazioni</a:t>
+            </a:r>
+            <a:r>
+              <a:rPr lang="en-US" dirty="0"/>
+              <a:t> </a:t>
+            </a:r>
+            <a:r>
+              <a:rPr lang="en-US" dirty="0" err="1"/>
+              <a:t>d’interesse</a:t>
+            </a:r>
+            <a:r>
+              <a:rPr lang="en-US" dirty="0"/>
+              <a:t> </a:t>
+            </a:r>
+            <a:r>
+              <a:rPr lang="en-US" dirty="0" err="1"/>
+              <a:t>contenute</a:t>
+            </a:r>
+            <a:r>
+              <a:rPr lang="en-US" dirty="0"/>
+              <a:t> </a:t>
+            </a:r>
+            <a:r>
+              <a:rPr lang="en-US" dirty="0" err="1"/>
+              <a:t>nelle</a:t>
+            </a:r>
+            <a:r>
+              <a:rPr lang="en-US" dirty="0"/>
+              <a:t> </a:t>
+            </a:r>
+            <a:r>
+              <a:rPr lang="en-US" dirty="0" err="1"/>
+              <a:t>tabelle</a:t>
+            </a:r>
+            <a:r>
+              <a:rPr lang="en-US" dirty="0"/>
+              <a:t>.</a:t>
+            </a:r>
+          </a:p>
+          <a:p>
+            <a:r>
+              <a:rPr lang="en-US" dirty="0"/>
+              <a:t>3)Il </a:t>
+            </a:r>
+            <a:r>
+              <a:rPr lang="en-US" dirty="0" err="1"/>
+              <a:t>terzo</a:t>
+            </a:r>
+            <a:r>
+              <a:rPr lang="en-US" dirty="0"/>
+              <a:t> </a:t>
+            </a:r>
+            <a:r>
+              <a:rPr lang="en-US" dirty="0" err="1"/>
+              <a:t>passo</a:t>
+            </a:r>
+            <a:r>
+              <a:rPr lang="en-US" dirty="0"/>
+              <a:t> </a:t>
+            </a:r>
+            <a:r>
+              <a:rPr lang="en-US" dirty="0" err="1"/>
+              <a:t>infine</a:t>
+            </a:r>
+            <a:r>
+              <a:rPr lang="en-US" dirty="0"/>
+              <a:t> ci è </a:t>
+            </a:r>
+            <a:r>
+              <a:rPr lang="en-US" dirty="0" err="1"/>
+              <a:t>servito</a:t>
+            </a:r>
+            <a:r>
+              <a:rPr lang="en-US" dirty="0"/>
+              <a:t> per </a:t>
+            </a:r>
+            <a:r>
+              <a:rPr lang="en-US" dirty="0" err="1"/>
+              <a:t>rilevare</a:t>
+            </a:r>
+            <a:r>
+              <a:rPr lang="en-US" dirty="0"/>
+              <a:t> </a:t>
+            </a:r>
+            <a:r>
+              <a:rPr lang="en-US" dirty="0" err="1"/>
+              <a:t>alcune</a:t>
+            </a:r>
+            <a:r>
+              <a:rPr lang="en-US" dirty="0"/>
+              <a:t> </a:t>
+            </a:r>
+            <a:r>
+              <a:rPr lang="en-US" dirty="0" err="1"/>
+              <a:t>importanti</a:t>
+            </a:r>
+            <a:r>
+              <a:rPr lang="en-US" dirty="0"/>
+              <a:t> </a:t>
+            </a:r>
+            <a:r>
+              <a:rPr lang="en-US" dirty="0" err="1"/>
+              <a:t>statistiche</a:t>
+            </a:r>
+            <a:r>
+              <a:rPr lang="en-US" dirty="0"/>
+              <a:t> </a:t>
+            </a:r>
+            <a:r>
+              <a:rPr lang="en-US" dirty="0" err="1"/>
+              <a:t>riguardanti</a:t>
+            </a:r>
+            <a:r>
+              <a:rPr lang="en-US" dirty="0"/>
+              <a:t> I </a:t>
+            </a:r>
+            <a:r>
+              <a:rPr lang="en-US" dirty="0" err="1"/>
+              <a:t>dati</a:t>
+            </a:r>
+            <a:r>
+              <a:rPr lang="en-US" dirty="0"/>
+              <a:t> </a:t>
+            </a:r>
+            <a:r>
+              <a:rPr lang="en-US" dirty="0" err="1"/>
+              <a:t>estratti</a:t>
+            </a:r>
+            <a:r>
+              <a:rPr lang="en-US" dirty="0"/>
+              <a:t>.</a:t>
+            </a:r>
           </a:p>
         </p:txBody>
       </p:sp>
@@ -20620,7 +21830,7 @@
           <a:p>
             <a:fld id="{7BE15B25-EFB2-474E-9B32-D94DD9C86BA1}" type="slidenum">
               <a:rPr lang="en-US" smtClean="0"/>
-              <a:t>5</a:t>
+              <a:t>2</a:t>
             </a:fld>
             <a:endParaRPr lang="en-US"/>
           </a:p>
@@ -20629,7 +21839,7 @@
     </p:spTree>
     <p:extLst>
       <p:ext uri="{BB962C8B-B14F-4D97-AF65-F5344CB8AC3E}">
-        <p14:creationId xmlns:p14="http://schemas.microsoft.com/office/powerpoint/2010/main" val="690256022"/>
+        <p14:creationId xmlns:p14="http://schemas.microsoft.com/office/powerpoint/2010/main" val="2415531671"/>
       </p:ext>
     </p:extLst>
   </p:cSld>
@@ -20684,64 +21894,20 @@
           <a:lstStyle/>
           <a:p>
             <a:r>
+              <a:rPr lang="en-US" dirty="0" err="1"/>
+              <a:t>Analizziamo</a:t>
+            </a:r>
+            <a:r>
               <a:rPr lang="en-US" dirty="0"/>
-              <a:t>XSL(</a:t>
+              <a:t> in </a:t>
             </a:r>
             <a:r>
               <a:rPr lang="en-US" dirty="0" err="1"/>
-              <a:t>eXtensible</a:t>
+              <a:t>dettaglio</a:t>
             </a:r>
             <a:r>
               <a:rPr lang="en-US" dirty="0"/>
-              <a:t> Stylesheet Language) </a:t>
-            </a:r>
-            <a:r>
-              <a:rPr lang="en-US" dirty="0" err="1"/>
-              <a:t>permette</a:t>
-            </a:r>
-            <a:r>
-              <a:rPr lang="en-US" dirty="0"/>
-              <a:t> di </a:t>
-            </a:r>
-            <a:r>
-              <a:rPr lang="en-US" dirty="0" err="1"/>
-              <a:t>visualizzare</a:t>
-            </a:r>
-            <a:r>
-              <a:rPr lang="en-US" dirty="0"/>
-              <a:t> lo </a:t>
-            </a:r>
-            <a:r>
-              <a:rPr lang="en-US" dirty="0" err="1"/>
-              <a:t>stesso</a:t>
-            </a:r>
-            <a:r>
-              <a:rPr lang="en-US" dirty="0"/>
-              <a:t> </a:t>
-            </a:r>
-            <a:r>
-              <a:rPr lang="en-US" dirty="0" err="1"/>
-              <a:t>documento</a:t>
-            </a:r>
-            <a:r>
-              <a:rPr lang="en-US" dirty="0"/>
-              <a:t> XML in </a:t>
-            </a:r>
-            <a:r>
-              <a:rPr lang="en-US" dirty="0" err="1"/>
-              <a:t>formati</a:t>
-            </a:r>
-            <a:r>
-              <a:rPr lang="en-US" dirty="0"/>
-              <a:t> </a:t>
-            </a:r>
-            <a:r>
-              <a:rPr lang="en-US" dirty="0" err="1"/>
-              <a:t>diversi</a:t>
-            </a:r>
-            <a:r>
-              <a:rPr lang="en-US" dirty="0"/>
-              <a:t> </a:t>
+              <a:t> lo step 1:</a:t>
             </a:r>
           </a:p>
         </p:txBody>
@@ -20763,7 +21929,7 @@
           <a:p>
             <a:fld id="{7BE15B25-EFB2-474E-9B32-D94DD9C86BA1}" type="slidenum">
               <a:rPr lang="en-US" smtClean="0"/>
-              <a:t>7</a:t>
+              <a:t>3</a:t>
             </a:fld>
             <a:endParaRPr lang="en-US"/>
           </a:p>
@@ -20772,7 +21938,7 @@
     </p:spTree>
     <p:extLst>
       <p:ext uri="{BB962C8B-B14F-4D97-AF65-F5344CB8AC3E}">
-        <p14:creationId xmlns:p14="http://schemas.microsoft.com/office/powerpoint/2010/main" val="1463216400"/>
+        <p14:creationId xmlns:p14="http://schemas.microsoft.com/office/powerpoint/2010/main" val="234220584"/>
       </p:ext>
     </p:extLst>
   </p:cSld>
@@ -20828,11 +21994,11 @@
           <a:p>
             <a:r>
               <a:rPr lang="en-US" dirty="0"/>
-              <a:t>Qui a voce </a:t>
+              <a:t>Come </a:t>
             </a:r>
             <a:r>
               <a:rPr lang="en-US" dirty="0" err="1"/>
-              <a:t>descriviamo</a:t>
+              <a:t>argomento</a:t>
             </a:r>
             <a:r>
               <a:rPr lang="en-US" dirty="0"/>
@@ -20840,7 +22006,47 @@
             </a:r>
             <a:r>
               <a:rPr lang="en-US" dirty="0" err="1"/>
-              <a:t>meglio</a:t>
+              <a:t>dei</a:t>
+            </a:r>
+            <a:r>
+              <a:rPr lang="en-US" dirty="0"/>
+              <a:t> papers </a:t>
+            </a:r>
+            <a:r>
+              <a:rPr lang="en-US" dirty="0" err="1"/>
+              <a:t>abbiamo</a:t>
+            </a:r>
+            <a:r>
+              <a:rPr lang="en-US" dirty="0"/>
+              <a:t> </a:t>
+            </a:r>
+            <a:r>
+              <a:rPr lang="en-US" dirty="0" err="1"/>
+              <a:t>selezionato</a:t>
+            </a:r>
+            <a:r>
+              <a:rPr lang="en-US" dirty="0"/>
+              <a:t> la “Pose estimation” </a:t>
+            </a:r>
+            <a:r>
+              <a:rPr lang="en-US" dirty="0" err="1"/>
+              <a:t>scaricando</a:t>
+            </a:r>
+            <a:r>
+              <a:rPr lang="en-US" dirty="0"/>
+              <a:t> poco piu di 300 </a:t>
+            </a:r>
+            <a:r>
+              <a:rPr lang="en-US" dirty="0" err="1"/>
+              <a:t>articoli</a:t>
+            </a:r>
+            <a:r>
+              <a:rPr lang="en-US" dirty="0"/>
+              <a:t> </a:t>
+            </a:r>
+            <a:r>
+              <a:rPr lang="en-US" dirty="0" err="1"/>
+              <a:t>tramite</a:t>
             </a:r>
             <a:r>
               <a:rPr lang="en-US" dirty="0"/>
@@ -20848,9 +22054,200 @@
             </a:r>
             <a:r>
               <a:rPr lang="en-US" dirty="0" err="1"/>
-              <a:t>codice</a:t>
-            </a:r>
-            <a:endParaRPr lang="en-US" dirty="0"/>
+              <a:t>sito</a:t>
+            </a:r>
+            <a:r>
+              <a:rPr lang="en-US" dirty="0"/>
+              <a:t> ar5iv.org.</a:t>
+            </a:r>
+          </a:p>
+          <a:p>
+            <a:r>
+              <a:rPr lang="en-US" dirty="0"/>
+              <a:t>Arxiv.org (con la ‘x’) è un </a:t>
+            </a:r>
+            <a:r>
+              <a:rPr lang="en-US" dirty="0" err="1"/>
+              <a:t>archivio</a:t>
+            </a:r>
+            <a:r>
+              <a:rPr lang="en-US" dirty="0"/>
+              <a:t> ad accesso libero </a:t>
+            </a:r>
+            <a:r>
+              <a:rPr lang="en-US" dirty="0" err="1"/>
+              <a:t>contenete</a:t>
+            </a:r>
+            <a:r>
+              <a:rPr lang="en-US" dirty="0"/>
+              <a:t> circa 2,4 </a:t>
+            </a:r>
+            <a:r>
+              <a:rPr lang="en-US" dirty="0" err="1"/>
+              <a:t>milioni</a:t>
+            </a:r>
+            <a:r>
+              <a:rPr lang="en-US" dirty="0"/>
+              <a:t> di </a:t>
+            </a:r>
+            <a:r>
+              <a:rPr lang="en-US" dirty="0" err="1"/>
+              <a:t>articoli</a:t>
+            </a:r>
+            <a:r>
+              <a:rPr lang="en-US" dirty="0"/>
+              <a:t> a </a:t>
+            </a:r>
+            <a:r>
+              <a:rPr lang="en-US" dirty="0" err="1"/>
+              <a:t>tema</a:t>
+            </a:r>
+            <a:r>
+              <a:rPr lang="en-US" dirty="0"/>
+              <a:t> </a:t>
+            </a:r>
+            <a:r>
+              <a:rPr lang="en-US" dirty="0" err="1"/>
+              <a:t>prevalentemente</a:t>
+            </a:r>
+            <a:r>
+              <a:rPr lang="en-US" dirty="0"/>
+              <a:t> </a:t>
+            </a:r>
+            <a:r>
+              <a:rPr lang="en-US" dirty="0" err="1"/>
+              <a:t>scientifico</a:t>
+            </a:r>
+            <a:r>
+              <a:rPr lang="en-US" dirty="0"/>
+              <a:t>.</a:t>
+            </a:r>
+          </a:p>
+          <a:p>
+            <a:r>
+              <a:rPr lang="en-US" dirty="0"/>
+              <a:t>Ar5iv.org </a:t>
+            </a:r>
+            <a:r>
+              <a:rPr lang="en-US" dirty="0" err="1"/>
+              <a:t>invece</a:t>
+            </a:r>
+            <a:r>
+              <a:rPr lang="en-US" dirty="0"/>
+              <a:t> è un </a:t>
+            </a:r>
+            <a:r>
+              <a:rPr lang="en-US" dirty="0" err="1"/>
+              <a:t>servizio</a:t>
+            </a:r>
+            <a:r>
+              <a:rPr lang="en-US" dirty="0"/>
+              <a:t> </a:t>
+            </a:r>
+            <a:r>
+              <a:rPr lang="en-US" dirty="0" err="1"/>
+              <a:t>che</a:t>
+            </a:r>
+            <a:r>
+              <a:rPr lang="en-US" dirty="0"/>
+              <a:t> </a:t>
+            </a:r>
+            <a:r>
+              <a:rPr lang="en-US" dirty="0" err="1"/>
+              <a:t>converte</a:t>
+            </a:r>
+            <a:r>
+              <a:rPr lang="en-US" dirty="0"/>
+              <a:t> </a:t>
+            </a:r>
+            <a:r>
+              <a:rPr lang="en-US" dirty="0" err="1"/>
+              <a:t>gli</a:t>
+            </a:r>
+            <a:r>
+              <a:rPr lang="en-US" dirty="0"/>
+              <a:t> </a:t>
+            </a:r>
+            <a:r>
+              <a:rPr lang="en-US" dirty="0" err="1"/>
+              <a:t>articoli</a:t>
+            </a:r>
+            <a:r>
+              <a:rPr lang="en-US" dirty="0"/>
+              <a:t> </a:t>
+            </a:r>
+            <a:r>
+              <a:rPr lang="en-US" dirty="0" err="1"/>
+              <a:t>presenti</a:t>
+            </a:r>
+            <a:r>
+              <a:rPr lang="en-US" dirty="0"/>
+              <a:t> </a:t>
+            </a:r>
+            <a:r>
+              <a:rPr lang="en-US" dirty="0" err="1"/>
+              <a:t>su</a:t>
+            </a:r>
+            <a:r>
+              <a:rPr lang="en-US" dirty="0"/>
+              <a:t> </a:t>
+            </a:r>
+            <a:r>
+              <a:rPr lang="en-US" dirty="0" err="1"/>
+              <a:t>arxiv</a:t>
+            </a:r>
+            <a:r>
+              <a:rPr lang="en-US" dirty="0"/>
+              <a:t> in </a:t>
+            </a:r>
+            <a:r>
+              <a:rPr lang="en-US" dirty="0" err="1"/>
+              <a:t>documenti</a:t>
+            </a:r>
+            <a:r>
+              <a:rPr lang="en-US" dirty="0"/>
+              <a:t> web HTML5 </a:t>
+            </a:r>
+            <a:r>
+              <a:rPr lang="en-US" dirty="0" err="1"/>
+              <a:t>permettendo</a:t>
+            </a:r>
+            <a:r>
+              <a:rPr lang="en-US" dirty="0"/>
+              <a:t> </a:t>
+            </a:r>
+            <a:r>
+              <a:rPr lang="en-US" dirty="0" err="1"/>
+              <a:t>una</a:t>
+            </a:r>
+            <a:r>
+              <a:rPr lang="en-US" dirty="0"/>
+              <a:t> </a:t>
+            </a:r>
+            <a:r>
+              <a:rPr lang="en-US" dirty="0" err="1"/>
+              <a:t>visualizzazione</a:t>
+            </a:r>
+            <a:r>
+              <a:rPr lang="en-US" dirty="0"/>
+              <a:t> </a:t>
+            </a:r>
+            <a:r>
+              <a:rPr lang="en-US" dirty="0" err="1"/>
+              <a:t>moderna</a:t>
+            </a:r>
+            <a:r>
+              <a:rPr lang="en-US" dirty="0"/>
+              <a:t> e </a:t>
+            </a:r>
+            <a:r>
+              <a:rPr lang="en-US" dirty="0" err="1"/>
+              <a:t>reattiva</a:t>
+            </a:r>
+            <a:r>
+              <a:rPr lang="en-US" dirty="0"/>
+              <a:t>.</a:t>
+            </a:r>
           </a:p>
         </p:txBody>
       </p:sp>
@@ -20871,7 +22268,7 @@
           <a:p>
             <a:fld id="{7BE15B25-EFB2-474E-9B32-D94DD9C86BA1}" type="slidenum">
               <a:rPr lang="en-US" smtClean="0"/>
-              <a:t>8</a:t>
+              <a:t>4</a:t>
             </a:fld>
             <a:endParaRPr lang="en-US"/>
           </a:p>
@@ -20880,7 +22277,7 @@
     </p:spTree>
     <p:extLst>
       <p:ext uri="{BB962C8B-B14F-4D97-AF65-F5344CB8AC3E}">
-        <p14:creationId xmlns:p14="http://schemas.microsoft.com/office/powerpoint/2010/main" val="2733499811"/>
+        <p14:creationId xmlns:p14="http://schemas.microsoft.com/office/powerpoint/2010/main" val="874458869"/>
       </p:ext>
     </p:extLst>
   </p:cSld>
@@ -20936,11 +22333,11 @@
           <a:p>
             <a:r>
               <a:rPr lang="en-US" dirty="0"/>
-              <a:t>Qui a voce </a:t>
+              <a:t>Per </a:t>
             </a:r>
             <a:r>
               <a:rPr lang="en-US" dirty="0" err="1"/>
-              <a:t>descriviamo</a:t>
+              <a:t>scaricare</a:t>
             </a:r>
             <a:r>
               <a:rPr lang="en-US" dirty="0"/>
@@ -20948,17 +22345,628 @@
             </a:r>
             <a:r>
               <a:rPr lang="en-US" dirty="0" err="1"/>
-              <a:t>meglio</a:t>
+              <a:t>automaticamente</a:t>
             </a:r>
             <a:r>
               <a:rPr lang="en-US" dirty="0"/>
-              <a:t> il </a:t>
+              <a:t> </a:t>
             </a:r>
             <a:r>
               <a:rPr lang="en-US" dirty="0" err="1"/>
-              <a:t>codice</a:t>
-            </a:r>
-            <a:endParaRPr lang="en-US" dirty="0"/>
+              <a:t>i</a:t>
+            </a:r>
+            <a:r>
+              <a:rPr lang="en-US" dirty="0"/>
+              <a:t> papers </a:t>
+            </a:r>
+            <a:r>
+              <a:rPr lang="en-US" dirty="0" err="1"/>
+              <a:t>riguaranti</a:t>
+            </a:r>
+            <a:r>
+              <a:rPr lang="en-US" dirty="0"/>
+              <a:t> la pose estimation </a:t>
+            </a:r>
+            <a:r>
+              <a:rPr lang="en-US" dirty="0" err="1"/>
+              <a:t>abbiamo</a:t>
+            </a:r>
+            <a:r>
+              <a:rPr lang="en-US" dirty="0"/>
+              <a:t> </a:t>
+            </a:r>
+            <a:r>
+              <a:rPr lang="en-US" dirty="0" err="1"/>
+              <a:t>creato</a:t>
+            </a:r>
+            <a:r>
+              <a:rPr lang="en-US" dirty="0"/>
+              <a:t> uno script Python </a:t>
+            </a:r>
+            <a:r>
+              <a:rPr lang="en-US" dirty="0" err="1"/>
+              <a:t>apposiatamente</a:t>
+            </a:r>
+            <a:r>
+              <a:rPr lang="en-US" dirty="0"/>
+              <a:t>:</a:t>
+            </a:r>
+          </a:p>
+          <a:p>
+            <a:r>
+              <a:rPr lang="en-US" dirty="0"/>
+              <a:t>Come prima </a:t>
+            </a:r>
+            <a:r>
+              <a:rPr lang="en-US" dirty="0" err="1"/>
+              <a:t>cosa</a:t>
+            </a:r>
+            <a:r>
+              <a:rPr lang="en-US" dirty="0"/>
+              <a:t> </a:t>
+            </a:r>
+            <a:r>
+              <a:rPr lang="en-US" dirty="0" err="1"/>
+              <a:t>abbiamo</a:t>
+            </a:r>
+            <a:r>
+              <a:rPr lang="en-US" dirty="0"/>
+              <a:t> </a:t>
+            </a:r>
+            <a:r>
+              <a:rPr lang="en-US" dirty="0" err="1"/>
+              <a:t>scaricato</a:t>
+            </a:r>
+            <a:r>
+              <a:rPr lang="en-US" dirty="0"/>
+              <a:t> la </a:t>
+            </a:r>
+            <a:r>
+              <a:rPr lang="en-US" dirty="0" err="1"/>
+              <a:t>pagina</a:t>
+            </a:r>
+            <a:r>
+              <a:rPr lang="en-US" dirty="0"/>
+              <a:t> di </a:t>
+            </a:r>
+            <a:r>
+              <a:rPr lang="en-US" dirty="0" err="1"/>
+              <a:t>arxiv</a:t>
+            </a:r>
+            <a:r>
+              <a:rPr lang="en-US" dirty="0"/>
+              <a:t> </a:t>
+            </a:r>
+            <a:r>
+              <a:rPr lang="en-US" dirty="0" err="1"/>
+              <a:t>contenente</a:t>
+            </a:r>
+            <a:r>
+              <a:rPr lang="en-US" dirty="0"/>
+              <a:t> la </a:t>
+            </a:r>
+            <a:r>
+              <a:rPr lang="en-US" dirty="0" err="1"/>
+              <a:t>lista</a:t>
+            </a:r>
+            <a:r>
+              <a:rPr lang="en-US" dirty="0"/>
+              <a:t> </a:t>
+            </a:r>
+            <a:r>
+              <a:rPr lang="en-US" dirty="0" err="1"/>
+              <a:t>dei</a:t>
+            </a:r>
+            <a:r>
+              <a:rPr lang="en-US" dirty="0"/>
+              <a:t> papers.</a:t>
+            </a:r>
+          </a:p>
+          <a:p>
+            <a:r>
+              <a:rPr lang="en-US" dirty="0" err="1"/>
+              <a:t>Tramite</a:t>
+            </a:r>
+            <a:r>
+              <a:rPr lang="en-US" dirty="0"/>
+              <a:t> la </a:t>
+            </a:r>
+            <a:r>
+              <a:rPr lang="en-US" dirty="0" err="1"/>
+              <a:t>libreria</a:t>
+            </a:r>
+            <a:r>
+              <a:rPr lang="en-US" dirty="0"/>
+              <a:t> beautiful soup </a:t>
+            </a:r>
+            <a:r>
+              <a:rPr lang="en-US" dirty="0" err="1"/>
+              <a:t>abbiamo</a:t>
+            </a:r>
+            <a:r>
+              <a:rPr lang="en-US" dirty="0"/>
+              <a:t> </a:t>
+            </a:r>
+            <a:r>
+              <a:rPr lang="en-US" dirty="0" err="1"/>
+              <a:t>parsato</a:t>
+            </a:r>
+            <a:r>
+              <a:rPr lang="en-US" dirty="0"/>
+              <a:t> la </a:t>
+            </a:r>
+            <a:r>
+              <a:rPr lang="en-US" dirty="0" err="1"/>
+              <a:t>pagina</a:t>
+            </a:r>
+            <a:r>
+              <a:rPr lang="en-US" dirty="0"/>
+              <a:t> </a:t>
+            </a:r>
+            <a:r>
+              <a:rPr lang="en-US" dirty="0" err="1"/>
+              <a:t>ottenenedo</a:t>
+            </a:r>
+            <a:r>
+              <a:rPr lang="en-US" dirty="0"/>
+              <a:t> </a:t>
+            </a:r>
+            <a:r>
+              <a:rPr lang="en-US" dirty="0" err="1"/>
+              <a:t>una</a:t>
+            </a:r>
+            <a:r>
+              <a:rPr lang="en-US" dirty="0"/>
+              <a:t> </a:t>
+            </a:r>
+            <a:r>
+              <a:rPr lang="en-US" dirty="0" err="1"/>
+              <a:t>rappresentazione</a:t>
+            </a:r>
+            <a:r>
+              <a:rPr lang="en-US" dirty="0"/>
+              <a:t> ad </a:t>
+            </a:r>
+            <a:r>
+              <a:rPr lang="en-US" dirty="0" err="1"/>
+              <a:t>albero</a:t>
+            </a:r>
+            <a:r>
+              <a:rPr lang="en-US" dirty="0"/>
+              <a:t> di tale </a:t>
+            </a:r>
+            <a:r>
+              <a:rPr lang="en-US" dirty="0" err="1"/>
+              <a:t>pagina</a:t>
+            </a:r>
+            <a:r>
+              <a:rPr lang="en-US" dirty="0"/>
+              <a:t>.</a:t>
+            </a:r>
+          </a:p>
+          <a:p>
+            <a:r>
+              <a:rPr lang="en-US" dirty="0" err="1"/>
+              <a:t>Questo</a:t>
+            </a:r>
+            <a:r>
+              <a:rPr lang="en-US" dirty="0"/>
+              <a:t> ci ha </a:t>
+            </a:r>
+            <a:r>
+              <a:rPr lang="en-US" dirty="0" err="1"/>
+              <a:t>facilitato</a:t>
+            </a:r>
+            <a:r>
+              <a:rPr lang="en-US" dirty="0"/>
+              <a:t> </a:t>
+            </a:r>
+            <a:r>
+              <a:rPr lang="en-US" dirty="0" err="1"/>
+              <a:t>nell’ottenere</a:t>
+            </a:r>
+            <a:r>
+              <a:rPr lang="en-US" dirty="0"/>
+              <a:t> tutti i </a:t>
+            </a:r>
+            <a:r>
+              <a:rPr lang="en-US" dirty="0" err="1"/>
+              <a:t>blocchi</a:t>
+            </a:r>
+            <a:r>
+              <a:rPr lang="en-US" dirty="0"/>
+              <a:t> </a:t>
+            </a:r>
+            <a:r>
+              <a:rPr lang="en-US" dirty="0" err="1"/>
+              <a:t>della</a:t>
+            </a:r>
+            <a:r>
+              <a:rPr lang="en-US" dirty="0"/>
+              <a:t> </a:t>
+            </a:r>
+            <a:r>
+              <a:rPr lang="en-US" dirty="0" err="1"/>
+              <a:t>pagina</a:t>
+            </a:r>
+            <a:r>
+              <a:rPr lang="en-US" dirty="0"/>
+              <a:t> </a:t>
+            </a:r>
+            <a:r>
+              <a:rPr lang="en-US" dirty="0" err="1"/>
+              <a:t>che</a:t>
+            </a:r>
+            <a:r>
+              <a:rPr lang="en-US" dirty="0"/>
+              <a:t> </a:t>
+            </a:r>
+            <a:r>
+              <a:rPr lang="en-US" dirty="0" err="1"/>
+              <a:t>contenessero</a:t>
+            </a:r>
+            <a:r>
+              <a:rPr lang="en-US" dirty="0"/>
+              <a:t> I link ai </a:t>
+            </a:r>
+            <a:r>
+              <a:rPr lang="en-US" dirty="0" err="1"/>
+              <a:t>vari</a:t>
+            </a:r>
+            <a:r>
+              <a:rPr lang="en-US" dirty="0"/>
+              <a:t> papers </a:t>
+            </a:r>
+            <a:r>
+              <a:rPr lang="en-US" dirty="0" err="1"/>
+              <a:t>che</a:t>
+            </a:r>
+            <a:r>
+              <a:rPr lang="en-US" dirty="0"/>
+              <a:t> </a:t>
+            </a:r>
+            <a:r>
+              <a:rPr lang="en-US" dirty="0" err="1"/>
+              <a:t>abbimao</a:t>
+            </a:r>
+            <a:r>
+              <a:rPr lang="en-US" dirty="0"/>
+              <a:t> </a:t>
+            </a:r>
+            <a:r>
+              <a:rPr lang="en-US" dirty="0" err="1"/>
+              <a:t>salvato</a:t>
+            </a:r>
+            <a:r>
+              <a:rPr lang="en-US" dirty="0"/>
+              <a:t> </a:t>
+            </a:r>
+            <a:r>
+              <a:rPr lang="en-US" dirty="0" err="1"/>
+              <a:t>nella</a:t>
+            </a:r>
+            <a:r>
+              <a:rPr lang="en-US" dirty="0"/>
+              <a:t> </a:t>
+            </a:r>
+            <a:r>
+              <a:rPr lang="en-US" dirty="0" err="1"/>
+              <a:t>variabile</a:t>
+            </a:r>
+            <a:r>
+              <a:rPr lang="en-US" dirty="0"/>
+              <a:t> </a:t>
+            </a:r>
+            <a:r>
+              <a:rPr lang="en-US" dirty="0" err="1"/>
+              <a:t>paper_list</a:t>
+            </a:r>
+            <a:r>
+              <a:rPr lang="en-US" dirty="0"/>
+              <a:t>.</a:t>
+            </a:r>
+          </a:p>
+          <a:p>
+            <a:r>
+              <a:rPr lang="en-US" dirty="0"/>
+              <a:t>Per </a:t>
+            </a:r>
+            <a:r>
+              <a:rPr lang="en-US" dirty="0" err="1"/>
+              <a:t>ciascun</a:t>
+            </a:r>
+            <a:r>
+              <a:rPr lang="en-US" dirty="0"/>
+              <a:t> </a:t>
+            </a:r>
+            <a:r>
+              <a:rPr lang="en-US" dirty="0" err="1"/>
+              <a:t>blocco</a:t>
+            </a:r>
+            <a:r>
+              <a:rPr lang="en-US" dirty="0"/>
+              <a:t> </a:t>
+            </a:r>
+            <a:r>
+              <a:rPr lang="en-US" dirty="0" err="1"/>
+              <a:t>abbiamo</a:t>
+            </a:r>
+            <a:r>
+              <a:rPr lang="en-US" dirty="0"/>
+              <a:t> </a:t>
+            </a:r>
+            <a:r>
+              <a:rPr lang="en-US" dirty="0" err="1"/>
+              <a:t>effettuato</a:t>
+            </a:r>
+            <a:r>
+              <a:rPr lang="en-US" dirty="0"/>
+              <a:t> 2 </a:t>
+            </a:r>
+            <a:r>
+              <a:rPr lang="en-US" dirty="0" err="1"/>
+              <a:t>operazioni</a:t>
+            </a:r>
+            <a:r>
+              <a:rPr lang="en-US" dirty="0"/>
+              <a:t> di </a:t>
+            </a:r>
+            <a:r>
+              <a:rPr lang="en-US" dirty="0" err="1"/>
+              <a:t>sanificazione</a:t>
+            </a:r>
+            <a:r>
+              <a:rPr lang="en-US" dirty="0"/>
+              <a:t>: </a:t>
+            </a:r>
+            <a:r>
+              <a:rPr lang="en-US" dirty="0" err="1"/>
+              <a:t>una</a:t>
+            </a:r>
+            <a:r>
+              <a:rPr lang="en-US" dirty="0"/>
+              <a:t> per </a:t>
+            </a:r>
+            <a:r>
+              <a:rPr lang="en-US" dirty="0" err="1"/>
+              <a:t>rimuovere</a:t>
+            </a:r>
+            <a:r>
+              <a:rPr lang="en-US" dirty="0"/>
+              <a:t> </a:t>
+            </a:r>
+            <a:r>
+              <a:rPr lang="en-US" dirty="0" err="1"/>
+              <a:t>eventuali</a:t>
+            </a:r>
+            <a:r>
+              <a:rPr lang="en-US" dirty="0"/>
+              <a:t> </a:t>
+            </a:r>
+            <a:r>
+              <a:rPr lang="en-US" dirty="0" err="1"/>
+              <a:t>caratteri</a:t>
+            </a:r>
+            <a:r>
+              <a:rPr lang="en-US" dirty="0"/>
+              <a:t> non </a:t>
+            </a:r>
+            <a:r>
+              <a:rPr lang="en-US" dirty="0" err="1"/>
+              <a:t>validi</a:t>
+            </a:r>
+            <a:r>
+              <a:rPr lang="en-US" dirty="0"/>
+              <a:t> </a:t>
+            </a:r>
+            <a:r>
+              <a:rPr lang="en-US" dirty="0" err="1"/>
+              <a:t>nei</a:t>
+            </a:r>
+            <a:r>
+              <a:rPr lang="en-US" dirty="0"/>
+              <a:t> </a:t>
+            </a:r>
+            <a:r>
+              <a:rPr lang="en-US" dirty="0" err="1"/>
+              <a:t>nomi</a:t>
+            </a:r>
+            <a:r>
+              <a:rPr lang="en-US" dirty="0"/>
+              <a:t> </a:t>
+            </a:r>
+            <a:r>
+              <a:rPr lang="en-US" dirty="0" err="1"/>
+              <a:t>dei</a:t>
+            </a:r>
+            <a:r>
+              <a:rPr lang="en-US" dirty="0"/>
+              <a:t> file e un </a:t>
+            </a:r>
+            <a:r>
+              <a:rPr lang="en-US" dirty="0" err="1"/>
+              <a:t>altra</a:t>
+            </a:r>
+            <a:r>
+              <a:rPr lang="en-US" dirty="0"/>
+              <a:t> per </a:t>
+            </a:r>
+            <a:r>
+              <a:rPr lang="en-US" dirty="0" err="1"/>
+              <a:t>modificare</a:t>
+            </a:r>
+            <a:r>
+              <a:rPr lang="en-US" dirty="0"/>
+              <a:t> il link di </a:t>
+            </a:r>
+            <a:r>
+              <a:rPr lang="en-US" dirty="0" err="1"/>
+              <a:t>ciascun</a:t>
+            </a:r>
+            <a:r>
+              <a:rPr lang="en-US" dirty="0"/>
+              <a:t> paper </a:t>
+            </a:r>
+            <a:r>
+              <a:rPr lang="en-US" dirty="0" err="1"/>
+              <a:t>sostituendo</a:t>
+            </a:r>
+            <a:r>
+              <a:rPr lang="en-US" dirty="0"/>
+              <a:t> arxiv.org con ar5iv.org.</a:t>
+            </a:r>
+          </a:p>
+          <a:p>
+            <a:r>
+              <a:rPr lang="en-US" dirty="0" err="1"/>
+              <a:t>Avendo</a:t>
+            </a:r>
+            <a:r>
+              <a:rPr lang="en-US" dirty="0"/>
+              <a:t> </a:t>
+            </a:r>
+            <a:r>
+              <a:rPr lang="en-US" dirty="0" err="1"/>
+              <a:t>adesso</a:t>
+            </a:r>
+            <a:r>
+              <a:rPr lang="en-US" dirty="0"/>
+              <a:t> a </a:t>
+            </a:r>
+            <a:r>
+              <a:rPr lang="en-US" dirty="0" err="1"/>
+              <a:t>disposizione</a:t>
+            </a:r>
+            <a:r>
+              <a:rPr lang="en-US" dirty="0"/>
+              <a:t> </a:t>
+            </a:r>
+            <a:r>
+              <a:rPr lang="en-US" dirty="0" err="1"/>
+              <a:t>i</a:t>
+            </a:r>
+            <a:r>
+              <a:rPr lang="en-US" dirty="0"/>
+              <a:t> paper in </a:t>
+            </a:r>
+            <a:r>
+              <a:rPr lang="en-US" dirty="0" err="1"/>
+              <a:t>formato</a:t>
+            </a:r>
+            <a:r>
+              <a:rPr lang="en-US" dirty="0"/>
+              <a:t> html </a:t>
+            </a:r>
+            <a:r>
+              <a:rPr lang="en-US" dirty="0" err="1"/>
+              <a:t>controlliamo</a:t>
+            </a:r>
+            <a:r>
+              <a:rPr lang="en-US" dirty="0"/>
+              <a:t> se il testo html di </a:t>
+            </a:r>
+            <a:r>
+              <a:rPr lang="en-US" dirty="0" err="1"/>
+              <a:t>ciascun</a:t>
+            </a:r>
+            <a:r>
+              <a:rPr lang="en-US" dirty="0"/>
+              <a:t> paper </a:t>
+            </a:r>
+            <a:r>
+              <a:rPr lang="en-US" dirty="0" err="1"/>
+              <a:t>scaricato</a:t>
+            </a:r>
+            <a:r>
+              <a:rPr lang="en-US" dirty="0"/>
+              <a:t> </a:t>
+            </a:r>
+            <a:r>
+              <a:rPr lang="en-US" dirty="0" err="1"/>
+              <a:t>conetnga</a:t>
+            </a:r>
+            <a:r>
+              <a:rPr lang="en-US" dirty="0"/>
+              <a:t> </a:t>
+            </a:r>
+            <a:r>
+              <a:rPr lang="en-US" dirty="0" err="1"/>
+              <a:t>delle</a:t>
+            </a:r>
+            <a:r>
+              <a:rPr lang="en-US" dirty="0"/>
+              <a:t> </a:t>
+            </a:r>
+            <a:r>
+              <a:rPr lang="en-US" dirty="0" err="1"/>
+              <a:t>tabelle</a:t>
+            </a:r>
+            <a:r>
+              <a:rPr lang="en-US" dirty="0"/>
+              <a:t>.</a:t>
+            </a:r>
+          </a:p>
+          <a:p>
+            <a:r>
+              <a:rPr lang="en-US" dirty="0"/>
+              <a:t>Se </a:t>
+            </a:r>
+            <a:r>
+              <a:rPr lang="en-US" dirty="0" err="1"/>
+              <a:t>cio</a:t>
+            </a:r>
+            <a:r>
+              <a:rPr lang="en-US" dirty="0"/>
+              <a:t> </a:t>
+            </a:r>
+            <a:r>
+              <a:rPr lang="en-US" dirty="0" err="1"/>
+              <a:t>si</a:t>
+            </a:r>
+            <a:r>
+              <a:rPr lang="en-US" dirty="0"/>
+              <a:t> è </a:t>
+            </a:r>
+            <a:r>
+              <a:rPr lang="en-US" dirty="0" err="1"/>
+              <a:t>verificato</a:t>
+            </a:r>
+            <a:r>
+              <a:rPr lang="en-US" dirty="0"/>
+              <a:t> </a:t>
+            </a:r>
+            <a:r>
+              <a:rPr lang="en-US" dirty="0" err="1"/>
+              <a:t>abbiamo</a:t>
+            </a:r>
+            <a:r>
+              <a:rPr lang="en-US" dirty="0"/>
+              <a:t> </a:t>
+            </a:r>
+            <a:r>
+              <a:rPr lang="en-US" dirty="0" err="1"/>
+              <a:t>aggiunto</a:t>
+            </a:r>
+            <a:r>
+              <a:rPr lang="en-US" dirty="0"/>
+              <a:t> tale paper </a:t>
+            </a:r>
+            <a:r>
+              <a:rPr lang="en-US" dirty="0" err="1"/>
+              <a:t>alla</a:t>
+            </a:r>
+            <a:r>
+              <a:rPr lang="en-US" dirty="0"/>
+              <a:t> </a:t>
+            </a:r>
+            <a:r>
+              <a:rPr lang="en-US" dirty="0" err="1"/>
+              <a:t>cartella</a:t>
+            </a:r>
+            <a:r>
+              <a:rPr lang="en-US" dirty="0"/>
+              <a:t> sources.</a:t>
+            </a:r>
           </a:p>
         </p:txBody>
       </p:sp>
@@ -20979,7 +22987,7 @@
           <a:p>
             <a:fld id="{7BE15B25-EFB2-474E-9B32-D94DD9C86BA1}" type="slidenum">
               <a:rPr lang="en-US" smtClean="0"/>
-              <a:t>9</a:t>
+              <a:t>5</a:t>
             </a:fld>
             <a:endParaRPr lang="en-US"/>
           </a:p>
@@ -20988,7 +22996,7 @@
     </p:spTree>
     <p:extLst>
       <p:ext uri="{BB962C8B-B14F-4D97-AF65-F5344CB8AC3E}">
-        <p14:creationId xmlns:p14="http://schemas.microsoft.com/office/powerpoint/2010/main" val="1815185529"/>
+        <p14:creationId xmlns:p14="http://schemas.microsoft.com/office/powerpoint/2010/main" val="690256022"/>
       </p:ext>
     </p:extLst>
   </p:cSld>
@@ -21043,20 +23051,40 @@
           <a:lstStyle/>
           <a:p>
             <a:r>
+              <a:rPr lang="en-US" dirty="0" err="1"/>
+              <a:t>Analizziamo</a:t>
+            </a:r>
+            <a:r>
               <a:rPr lang="en-US" dirty="0"/>
-              <a:t>XSL(</a:t>
+              <a:t> </a:t>
             </a:r>
             <a:r>
               <a:rPr lang="en-US" dirty="0" err="1"/>
-              <a:t>eXtensible</a:t>
+              <a:t>meglio</a:t>
             </a:r>
             <a:r>
               <a:rPr lang="en-US" dirty="0"/>
-              <a:t> Stylesheet Language) </a:t>
+              <a:t> </a:t>
             </a:r>
             <a:r>
               <a:rPr lang="en-US" dirty="0" err="1"/>
-              <a:t>permette</a:t>
+              <a:t>ora</a:t>
+            </a:r>
+            <a:r>
+              <a:rPr lang="en-US" dirty="0"/>
+              <a:t> lo step 2, </a:t>
+            </a:r>
+            <a:r>
+              <a:rPr lang="en-US" dirty="0" err="1"/>
+              <a:t>ovvero</a:t>
+            </a:r>
+            <a:r>
+              <a:rPr lang="en-US" dirty="0"/>
+              <a:t> la </a:t>
+            </a:r>
+            <a:r>
+              <a:rPr lang="en-US" dirty="0" err="1"/>
+              <a:t>fase</a:t>
             </a:r>
             <a:r>
               <a:rPr lang="en-US" dirty="0"/>
@@ -21064,15 +23092,7 @@
             </a:r>
             <a:r>
               <a:rPr lang="en-US" dirty="0" err="1"/>
-              <a:t>visualizzare</a:t>
-            </a:r>
-            <a:r>
-              <a:rPr lang="en-US" dirty="0"/>
-              <a:t> lo </a:t>
-            </a:r>
-            <a:r>
-              <a:rPr lang="en-US" dirty="0" err="1"/>
-              <a:t>stesso</a:t>
+              <a:t>estrazione</a:t>
             </a:r>
             <a:r>
               <a:rPr lang="en-US" dirty="0"/>
@@ -21080,15 +23100,7 @@
             </a:r>
             <a:r>
               <a:rPr lang="en-US" dirty="0" err="1"/>
-              <a:t>documento</a:t>
-            </a:r>
-            <a:r>
-              <a:rPr lang="en-US" dirty="0"/>
-              <a:t> XML in </a:t>
-            </a:r>
-            <a:r>
-              <a:rPr lang="en-US" dirty="0" err="1"/>
-              <a:t>formati</a:t>
+              <a:t>delle</a:t>
             </a:r>
             <a:r>
               <a:rPr lang="en-US" dirty="0"/>
@@ -21096,11 +23108,35 @@
             </a:r>
             <a:r>
               <a:rPr lang="en-US" dirty="0" err="1"/>
-              <a:t>diversi</a:t>
+              <a:t>informazioni</a:t>
             </a:r>
             <a:r>
               <a:rPr lang="en-US" dirty="0"/>
               <a:t> </a:t>
+            </a:r>
+            <a:r>
+              <a:rPr lang="en-US" dirty="0" err="1"/>
+              <a:t>dai</a:t>
+            </a:r>
+            <a:r>
+              <a:rPr lang="en-US" dirty="0"/>
+              <a:t> papers e di </a:t>
+            </a:r>
+            <a:r>
+              <a:rPr lang="en-US" dirty="0" err="1"/>
+              <a:t>creazione</a:t>
+            </a:r>
+            <a:r>
+              <a:rPr lang="en-US" dirty="0"/>
+              <a:t> di file </a:t>
+            </a:r>
+            <a:r>
+              <a:rPr lang="en-US" dirty="0" err="1"/>
+              <a:t>json</a:t>
+            </a:r>
+            <a:r>
+              <a:rPr lang="en-US" dirty="0"/>
+              <a:t>:</a:t>
             </a:r>
           </a:p>
         </p:txBody>
@@ -21122,7 +23158,7 @@
           <a:p>
             <a:fld id="{7BE15B25-EFB2-474E-9B32-D94DD9C86BA1}" type="slidenum">
               <a:rPr lang="en-US" smtClean="0"/>
-              <a:t>10</a:t>
+              <a:t>6</a:t>
             </a:fld>
             <a:endParaRPr lang="en-US"/>
           </a:p>
@@ -21131,7 +23167,7 @@
     </p:spTree>
     <p:extLst>
       <p:ext uri="{BB962C8B-B14F-4D97-AF65-F5344CB8AC3E}">
-        <p14:creationId xmlns:p14="http://schemas.microsoft.com/office/powerpoint/2010/main" val="1829218800"/>
+        <p14:creationId xmlns:p14="http://schemas.microsoft.com/office/powerpoint/2010/main" val="4187436330"/>
       </p:ext>
     </p:extLst>
   </p:cSld>
@@ -21246,6 +23282,79 @@
               <a:t> </a:t>
             </a:r>
           </a:p>
+          <a:p>
+            <a:endParaRPr lang="en-US" dirty="0"/>
+          </a:p>
+          <a:p>
+            <a:r>
+              <a:rPr lang="en-US" dirty="0"/>
+              <a:t>Per </a:t>
+            </a:r>
+            <a:r>
+              <a:rPr lang="en-US" dirty="0" err="1"/>
+              <a:t>estrarre</a:t>
+            </a:r>
+            <a:r>
+              <a:rPr lang="en-US" dirty="0"/>
+              <a:t> </a:t>
+            </a:r>
+            <a:r>
+              <a:rPr lang="en-US" dirty="0" err="1"/>
+              <a:t>rapidamente</a:t>
+            </a:r>
+            <a:r>
+              <a:rPr lang="en-US" dirty="0"/>
+              <a:t> le </a:t>
+            </a:r>
+            <a:r>
+              <a:rPr lang="en-US" dirty="0" err="1"/>
+              <a:t>informazioni</a:t>
+            </a:r>
+            <a:r>
+              <a:rPr lang="en-US" dirty="0"/>
+              <a:t> di interesse </a:t>
+            </a:r>
+            <a:r>
+              <a:rPr lang="en-US" dirty="0" err="1"/>
+              <a:t>abbiamo</a:t>
+            </a:r>
+            <a:r>
+              <a:rPr lang="en-US" dirty="0"/>
+              <a:t> </a:t>
+            </a:r>
+            <a:r>
+              <a:rPr lang="en-US" dirty="0" err="1"/>
+              <a:t>usufruito</a:t>
+            </a:r>
+            <a:r>
+              <a:rPr lang="en-US" dirty="0"/>
+              <a:t> del </a:t>
+            </a:r>
+            <a:r>
+              <a:rPr lang="en-US" dirty="0" err="1"/>
+              <a:t>linguaggio</a:t>
+            </a:r>
+            <a:r>
+              <a:rPr lang="en-US" dirty="0"/>
+              <a:t> </a:t>
+            </a:r>
+            <a:r>
+              <a:rPr lang="en-US" dirty="0" err="1"/>
+              <a:t>xpath</a:t>
+            </a:r>
+            <a:r>
+              <a:rPr lang="en-US" dirty="0"/>
+              <a:t>: {testo </a:t>
+            </a:r>
+            <a:r>
+              <a:rPr lang="en-US" dirty="0" err="1"/>
+              <a:t>sulla</a:t>
+            </a:r>
+            <a:r>
+              <a:rPr lang="en-US" dirty="0"/>
+              <a:t> slide}</a:t>
+            </a:r>
+          </a:p>
         </p:txBody>
       </p:sp>
       <p:sp>
@@ -21265,7 +23374,7 @@
           <a:p>
             <a:fld id="{7BE15B25-EFB2-474E-9B32-D94DD9C86BA1}" type="slidenum">
               <a:rPr lang="en-US" smtClean="0"/>
-              <a:t>11</a:t>
+              <a:t>7</a:t>
             </a:fld>
             <a:endParaRPr lang="en-US"/>
           </a:p>
@@ -21274,7 +23383,7 @@
     </p:spTree>
     <p:extLst>
       <p:ext uri="{BB962C8B-B14F-4D97-AF65-F5344CB8AC3E}">
-        <p14:creationId xmlns:p14="http://schemas.microsoft.com/office/powerpoint/2010/main" val="295850280"/>
+        <p14:creationId xmlns:p14="http://schemas.microsoft.com/office/powerpoint/2010/main" val="1463216400"/>
       </p:ext>
     </p:extLst>
   </p:cSld>
@@ -21330,35 +23439,11 @@
           <a:p>
             <a:r>
               <a:rPr lang="en-US" dirty="0"/>
-              <a:t>XSL(</a:t>
+              <a:t>Come </a:t>
             </a:r>
             <a:r>
               <a:rPr lang="en-US" dirty="0" err="1"/>
-              <a:t>eXtensible</a:t>
-            </a:r>
-            <a:r>
-              <a:rPr lang="en-US" dirty="0"/>
-              <a:t> Stylesheet Language) </a:t>
-            </a:r>
-            <a:r>
-              <a:rPr lang="en-US" dirty="0" err="1"/>
-              <a:t>permette</a:t>
-            </a:r>
-            <a:r>
-              <a:rPr lang="en-US" dirty="0"/>
-              <a:t> di </a:t>
-            </a:r>
-            <a:r>
-              <a:rPr lang="en-US" dirty="0" err="1"/>
-              <a:t>visualizzare</a:t>
-            </a:r>
-            <a:r>
-              <a:rPr lang="en-US" dirty="0"/>
-              <a:t> lo </a:t>
-            </a:r>
-            <a:r>
-              <a:rPr lang="en-US" dirty="0" err="1"/>
-              <a:t>stesso</a:t>
+              <a:t>possiamo</a:t>
             </a:r>
             <a:r>
               <a:rPr lang="en-US" dirty="0"/>
@@ -21366,15 +23451,15 @@
             </a:r>
             <a:r>
               <a:rPr lang="en-US" dirty="0" err="1"/>
-              <a:t>documento</a:t>
+              <a:t>osservare</a:t>
             </a:r>
             <a:r>
               <a:rPr lang="en-US" dirty="0"/>
-              <a:t> XML in </a:t>
+              <a:t> qui ci </a:t>
             </a:r>
             <a:r>
               <a:rPr lang="en-US" dirty="0" err="1"/>
-              <a:t>formati</a:t>
+              <a:t>troviamo</a:t>
             </a:r>
             <a:r>
               <a:rPr lang="en-US" dirty="0"/>
@@ -21382,11 +23467,107 @@
             </a:r>
             <a:r>
               <a:rPr lang="en-US" dirty="0" err="1"/>
-              <a:t>diversi</a:t>
+              <a:t>nel</a:t>
+            </a:r>
+            <a:r>
+              <a:rPr lang="en-US" dirty="0"/>
+              <a:t> main e </a:t>
+            </a:r>
+            <a:r>
+              <a:rPr lang="en-US" dirty="0" err="1"/>
+              <a:t>cio</a:t>
             </a:r>
             <a:r>
               <a:rPr lang="en-US" dirty="0"/>
               <a:t> </a:t>
+            </a:r>
+            <a:r>
+              <a:rPr lang="en-US" dirty="0" err="1"/>
+              <a:t>che</a:t>
+            </a:r>
+            <a:r>
+              <a:rPr lang="en-US" dirty="0"/>
+              <a:t> </a:t>
+            </a:r>
+            <a:r>
+              <a:rPr lang="en-US" dirty="0" err="1"/>
+              <a:t>facciamo</a:t>
+            </a:r>
+            <a:r>
+              <a:rPr lang="en-US" dirty="0"/>
+              <a:t> è </a:t>
+            </a:r>
+            <a:r>
+              <a:rPr lang="en-US" dirty="0" err="1"/>
+              <a:t>invocare</a:t>
+            </a:r>
+            <a:r>
+              <a:rPr lang="en-US" dirty="0"/>
+              <a:t> per </a:t>
+            </a:r>
+            <a:r>
+              <a:rPr lang="en-US" dirty="0" err="1"/>
+              <a:t>ogni</a:t>
+            </a:r>
+            <a:r>
+              <a:rPr lang="en-US" dirty="0"/>
+              <a:t> </a:t>
+            </a:r>
+            <a:r>
+              <a:rPr lang="en-US" dirty="0" err="1"/>
+              <a:t>documento</a:t>
+            </a:r>
+            <a:r>
+              <a:rPr lang="en-US" dirty="0"/>
+              <a:t> HTML </a:t>
+            </a:r>
+            <a:r>
+              <a:rPr lang="en-US" dirty="0" err="1"/>
+              <a:t>una</a:t>
+            </a:r>
+            <a:r>
+              <a:rPr lang="en-US" dirty="0"/>
+              <a:t> </a:t>
+            </a:r>
+            <a:r>
+              <a:rPr lang="en-US" dirty="0" err="1"/>
+              <a:t>funzione</a:t>
+            </a:r>
+            <a:r>
+              <a:rPr lang="en-US" dirty="0"/>
+              <a:t> </a:t>
+            </a:r>
+            <a:r>
+              <a:rPr lang="en-US" dirty="0" err="1"/>
+              <a:t>denominata</a:t>
+            </a:r>
+            <a:r>
+              <a:rPr lang="en-US" dirty="0"/>
+              <a:t> </a:t>
+            </a:r>
+            <a:r>
+              <a:rPr lang="en-US" dirty="0" err="1"/>
+              <a:t>exratct_information</a:t>
+            </a:r>
+            <a:r>
+              <a:rPr lang="en-US" dirty="0"/>
+              <a:t> </a:t>
+            </a:r>
+            <a:r>
+              <a:rPr lang="en-US" dirty="0" err="1"/>
+              <a:t>che</a:t>
+            </a:r>
+            <a:r>
+              <a:rPr lang="en-US" dirty="0"/>
+              <a:t> a breve </a:t>
+            </a:r>
+            <a:r>
+              <a:rPr lang="en-US" dirty="0" err="1"/>
+              <a:t>definiremo</a:t>
+            </a:r>
+            <a:r>
+              <a:rPr lang="en-US" dirty="0"/>
+              <a:t>. </a:t>
             </a:r>
           </a:p>
         </p:txBody>
@@ -21408,7 +23589,7 @@
           <a:p>
             <a:fld id="{7BE15B25-EFB2-474E-9B32-D94DD9C86BA1}" type="slidenum">
               <a:rPr lang="en-US" smtClean="0"/>
-              <a:t>12</a:t>
+              <a:t>8</a:t>
             </a:fld>
             <a:endParaRPr lang="en-US"/>
           </a:p>
@@ -21417,7 +23598,7 @@
     </p:spTree>
     <p:extLst>
       <p:ext uri="{BB962C8B-B14F-4D97-AF65-F5344CB8AC3E}">
-        <p14:creationId xmlns:p14="http://schemas.microsoft.com/office/powerpoint/2010/main" val="428625984"/>
+        <p14:creationId xmlns:p14="http://schemas.microsoft.com/office/powerpoint/2010/main" val="2733499811"/>
       </p:ext>
     </p:extLst>
   </p:cSld>
@@ -21473,35 +23654,11 @@
           <a:p>
             <a:r>
               <a:rPr lang="en-US" dirty="0"/>
-              <a:t>XSL(</a:t>
+              <a:t>Qui a voce </a:t>
             </a:r>
             <a:r>
               <a:rPr lang="en-US" dirty="0" err="1"/>
-              <a:t>eXtensible</a:t>
-            </a:r>
-            <a:r>
-              <a:rPr lang="en-US" dirty="0"/>
-              <a:t> Stylesheet Language) </a:t>
-            </a:r>
-            <a:r>
-              <a:rPr lang="en-US" dirty="0" err="1"/>
-              <a:t>permette</a:t>
-            </a:r>
-            <a:r>
-              <a:rPr lang="en-US" dirty="0"/>
-              <a:t> di </a:t>
-            </a:r>
-            <a:r>
-              <a:rPr lang="en-US" dirty="0" err="1"/>
-              <a:t>visualizzare</a:t>
-            </a:r>
-            <a:r>
-              <a:rPr lang="en-US" dirty="0"/>
-              <a:t> lo </a:t>
-            </a:r>
-            <a:r>
-              <a:rPr lang="en-US" dirty="0" err="1"/>
-              <a:t>stesso</a:t>
+              <a:t>descriviamo</a:t>
             </a:r>
             <a:r>
               <a:rPr lang="en-US" dirty="0"/>
@@ -21509,28 +23666,17 @@
             </a:r>
             <a:r>
               <a:rPr lang="en-US" dirty="0" err="1"/>
-              <a:t>documento</a:t>
+              <a:t>meglio</a:t>
             </a:r>
             <a:r>
               <a:rPr lang="en-US" dirty="0"/>
-              <a:t> XML in </a:t>
+              <a:t> il </a:t>
             </a:r>
             <a:r>
               <a:rPr lang="en-US" dirty="0" err="1"/>
-              <a:t>formati</a:t>
-            </a:r>
-            <a:r>
-              <a:rPr lang="en-US" dirty="0"/>
-              <a:t> </a:t>
-            </a:r>
-            <a:r>
-              <a:rPr lang="en-US" dirty="0" err="1"/>
-              <a:t>diversi</a:t>
-            </a:r>
-            <a:r>
-              <a:rPr lang="en-US" dirty="0"/>
-              <a:t> </a:t>
-            </a:r>
+              <a:t>codice</a:t>
+            </a:r>
+            <a:endParaRPr lang="en-US" dirty="0"/>
           </a:p>
         </p:txBody>
       </p:sp>
@@ -21551,7 +23697,7 @@
           <a:p>
             <a:fld id="{7BE15B25-EFB2-474E-9B32-D94DD9C86BA1}" type="slidenum">
               <a:rPr lang="en-US" smtClean="0"/>
-              <a:t>13</a:t>
+              <a:t>9</a:t>
             </a:fld>
             <a:endParaRPr lang="en-US"/>
           </a:p>
@@ -21560,7 +23706,7 @@
     </p:spTree>
     <p:extLst>
       <p:ext uri="{BB962C8B-B14F-4D97-AF65-F5344CB8AC3E}">
-        <p14:creationId xmlns:p14="http://schemas.microsoft.com/office/powerpoint/2010/main" val="438507635"/>
+        <p14:creationId xmlns:p14="http://schemas.microsoft.com/office/powerpoint/2010/main" val="1815185529"/>
       </p:ext>
     </p:extLst>
   </p:cSld>
@@ -21721,7 +23867,7 @@
           <a:p>
             <a:fld id="{326951E3-958F-4611-B170-D081BA0250F9}" type="datetimeFigureOut">
               <a:rPr lang="en-US" smtClean="0"/>
-              <a:t>10/18/2024</a:t>
+              <a:t>10/24/2024</a:t>
             </a:fld>
             <a:endParaRPr lang="en-US"/>
           </a:p>
@@ -21919,7 +24065,7 @@
           <a:p>
             <a:fld id="{326951E3-958F-4611-B170-D081BA0250F9}" type="datetimeFigureOut">
               <a:rPr lang="en-US" smtClean="0"/>
-              <a:t>10/18/2024</a:t>
+              <a:t>10/24/2024</a:t>
             </a:fld>
             <a:endParaRPr lang="en-US"/>
           </a:p>
@@ -22127,7 +24273,7 @@
           <a:p>
             <a:fld id="{326951E3-958F-4611-B170-D081BA0250F9}" type="datetimeFigureOut">
               <a:rPr lang="en-US" smtClean="0"/>
-              <a:t>10/18/2024</a:t>
+              <a:t>10/24/2024</a:t>
             </a:fld>
             <a:endParaRPr lang="en-US"/>
           </a:p>
@@ -22325,7 +24471,7 @@
           <a:p>
             <a:fld id="{326951E3-958F-4611-B170-D081BA0250F9}" type="datetimeFigureOut">
               <a:rPr lang="en-US" smtClean="0"/>
-              <a:t>10/18/2024</a:t>
+              <a:t>10/24/2024</a:t>
             </a:fld>
             <a:endParaRPr lang="en-US"/>
           </a:p>
@@ -22602,7 +24748,7 @@
           <a:p>
             <a:fld id="{326951E3-958F-4611-B170-D081BA0250F9}" type="datetimeFigureOut">
               <a:rPr lang="en-US" smtClean="0"/>
-              <a:t>10/18/2024</a:t>
+              <a:t>10/24/2024</a:t>
             </a:fld>
             <a:endParaRPr lang="en-US"/>
           </a:p>
@@ -22867,7 +25013,7 @@
           <a:p>
             <a:fld id="{326951E3-958F-4611-B170-D081BA0250F9}" type="datetimeFigureOut">
               <a:rPr lang="en-US" smtClean="0"/>
-              <a:t>10/18/2024</a:t>
+              <a:t>10/24/2024</a:t>
             </a:fld>
             <a:endParaRPr lang="en-US"/>
           </a:p>
@@ -23289,7 +25435,7 @@
           <a:p>
             <a:fld id="{326951E3-958F-4611-B170-D081BA0250F9}" type="datetimeFigureOut">
               <a:rPr lang="en-US" smtClean="0"/>
-              <a:t>10/18/2024</a:t>
+              <a:t>10/24/2024</a:t>
             </a:fld>
             <a:endParaRPr lang="en-US"/>
           </a:p>
@@ -23441,7 +25587,7 @@
           <a:p>
             <a:fld id="{326951E3-958F-4611-B170-D081BA0250F9}" type="datetimeFigureOut">
               <a:rPr lang="en-US" smtClean="0"/>
-              <a:t>10/18/2024</a:t>
+              <a:t>10/24/2024</a:t>
             </a:fld>
             <a:endParaRPr lang="en-US"/>
           </a:p>
@@ -23554,7 +25700,7 @@
           <a:p>
             <a:fld id="{326951E3-958F-4611-B170-D081BA0250F9}" type="datetimeFigureOut">
               <a:rPr lang="en-US" smtClean="0"/>
-              <a:t>10/18/2024</a:t>
+              <a:t>10/24/2024</a:t>
             </a:fld>
             <a:endParaRPr lang="en-US"/>
           </a:p>
@@ -23872,7 +26018,7 @@
           <a:p>
             <a:fld id="{326951E3-958F-4611-B170-D081BA0250F9}" type="datetimeFigureOut">
               <a:rPr lang="en-US" smtClean="0"/>
-              <a:t>10/18/2024</a:t>
+              <a:t>10/24/2024</a:t>
             </a:fld>
             <a:endParaRPr lang="en-US"/>
           </a:p>
@@ -24208,7 +26354,7 @@
           <a:p>
             <a:fld id="{326951E3-958F-4611-B170-D081BA0250F9}" type="datetimeFigureOut">
               <a:rPr lang="en-US" smtClean="0"/>
-              <a:t>10/18/2024</a:t>
+              <a:t>10/24/2024</a:t>
             </a:fld>
             <a:endParaRPr lang="en-US"/>
           </a:p>
@@ -24494,7 +26640,7 @@
             <a:fld id="{326951E3-958F-4611-B170-D081BA0250F9}" type="datetimeFigureOut">
               <a:rPr lang="en-US" smtClean="0"/>
               <a:pPr/>
-              <a:t>10/18/2024</a:t>
+              <a:t>10/24/2024</a:t>
             </a:fld>
             <a:endParaRPr lang="en-US" dirty="0"/>
           </a:p>
@@ -25031,7 +27177,7 @@
           <p:nvPr/>
         </p:nvPicPr>
         <p:blipFill>
-          <a:blip r:embed="rId2">
+          <a:blip r:embed="rId3">
             <a:alphaModFix amt="60000"/>
           </a:blip>
           <a:srcRect t="13980" r="-2" b="27597"/>
@@ -25464,7 +27610,7 @@
           <p:nvPr/>
         </p:nvPicPr>
         <p:blipFill>
-          <a:blip r:embed="rId3">
+          <a:blip r:embed="rId4">
             <a:duotone>
               <a:schemeClr val="accent6">
                 <a:shade val="45000"/>
@@ -26229,13 +28375,13 @@
   <p:clrMapOvr>
     <a:masterClrMapping/>
   </p:clrMapOvr>
-  <mc:AlternateContent xmlns:mc="http://schemas.openxmlformats.org/markup-compatibility/2006">
-    <mc:Choice xmlns:p159="http://schemas.microsoft.com/office/powerpoint/2015/09/main" Requires="p159">
+  <mc:AlternateContent xmlns:mc="http://schemas.openxmlformats.org/markup-compatibility/2006" xmlns:p159="http://schemas.microsoft.com/office/powerpoint/2015/09/main">
+    <mc:Choice Requires="p159">
       <p:transition xmlns:p14="http://schemas.microsoft.com/office/powerpoint/2010/main" spd="slow" p14:dur="2000">
         <p159:morph option="byObject"/>
       </p:transition>
     </mc:Choice>
-    <mc:Fallback>
+    <mc:Fallback xmlns="">
       <p:transition spd="slow">
         <p:fade/>
       </p:transition>
@@ -27093,13 +29239,13 @@
   <p:clrMapOvr>
     <a:masterClrMapping/>
   </p:clrMapOvr>
-  <mc:AlternateContent xmlns:mc="http://schemas.openxmlformats.org/markup-compatibility/2006">
-    <mc:Choice xmlns:p159="http://schemas.microsoft.com/office/powerpoint/2015/09/main" Requires="p159">
+  <mc:AlternateContent xmlns:mc="http://schemas.openxmlformats.org/markup-compatibility/2006" xmlns:p159="http://schemas.microsoft.com/office/powerpoint/2015/09/main">
+    <mc:Choice Requires="p159">
       <p:transition xmlns:p14="http://schemas.microsoft.com/office/powerpoint/2010/main" spd="slow" p14:dur="2000">
         <p159:morph option="byObject"/>
       </p:transition>
     </mc:Choice>
-    <mc:Fallback>
+    <mc:Fallback xmlns="">
       <p:transition spd="slow">
         <p:fade/>
       </p:transition>
@@ -28122,13 +30268,13 @@
   <p:clrMapOvr>
     <a:masterClrMapping/>
   </p:clrMapOvr>
-  <mc:AlternateContent xmlns:mc="http://schemas.openxmlformats.org/markup-compatibility/2006">
-    <mc:Choice xmlns:p159="http://schemas.microsoft.com/office/powerpoint/2015/09/main" Requires="p159">
+  <mc:AlternateContent xmlns:mc="http://schemas.openxmlformats.org/markup-compatibility/2006" xmlns:p159="http://schemas.microsoft.com/office/powerpoint/2015/09/main">
+    <mc:Choice Requires="p159">
       <p:transition xmlns:p14="http://schemas.microsoft.com/office/powerpoint/2010/main" spd="slow" p14:dur="2000">
         <p159:morph option="byObject"/>
       </p:transition>
     </mc:Choice>
-    <mc:Fallback>
+    <mc:Fallback xmlns="">
       <p:transition spd="slow">
         <p:fade/>
       </p:transition>
@@ -29180,13 +31326,13 @@
   <p:clrMapOvr>
     <a:masterClrMapping/>
   </p:clrMapOvr>
-  <mc:AlternateContent xmlns:mc="http://schemas.openxmlformats.org/markup-compatibility/2006">
-    <mc:Choice xmlns:p159="http://schemas.microsoft.com/office/powerpoint/2015/09/main" Requires="p159">
+  <mc:AlternateContent xmlns:mc="http://schemas.openxmlformats.org/markup-compatibility/2006" xmlns:p159="http://schemas.microsoft.com/office/powerpoint/2015/09/main">
+    <mc:Choice Requires="p159">
       <p:transition xmlns:p14="http://schemas.microsoft.com/office/powerpoint/2010/main" spd="slow" p14:dur="2000">
         <p159:morph option="byObject"/>
       </p:transition>
     </mc:Choice>
-    <mc:Fallback>
+    <mc:Fallback xmlns="">
       <p:transition spd="slow">
         <p:fade/>
       </p:transition>
@@ -30977,13 +33123,13 @@
   <p:clrMapOvr>
     <a:masterClrMapping/>
   </p:clrMapOvr>
-  <mc:AlternateContent xmlns:mc="http://schemas.openxmlformats.org/markup-compatibility/2006">
-    <mc:Choice xmlns:p159="http://schemas.microsoft.com/office/powerpoint/2015/09/main" Requires="p159">
+  <mc:AlternateContent xmlns:mc="http://schemas.openxmlformats.org/markup-compatibility/2006" xmlns:p159="http://schemas.microsoft.com/office/powerpoint/2015/09/main">
+    <mc:Choice Requires="p159">
       <p:transition xmlns:p14="http://schemas.microsoft.com/office/powerpoint/2010/main" spd="slow" p14:dur="2000">
         <p159:morph option="byObject"/>
       </p:transition>
     </mc:Choice>
-    <mc:Fallback>
+    <mc:Fallback xmlns="">
       <p:transition spd="slow">
         <p:fade/>
       </p:transition>
@@ -31584,13 +33730,13 @@
   <p:clrMapOvr>
     <a:masterClrMapping/>
   </p:clrMapOvr>
-  <mc:AlternateContent xmlns:mc="http://schemas.openxmlformats.org/markup-compatibility/2006">
-    <mc:Choice xmlns:p159="http://schemas.microsoft.com/office/powerpoint/2015/09/main" Requires="p159">
+  <mc:AlternateContent xmlns:mc="http://schemas.openxmlformats.org/markup-compatibility/2006" xmlns:p159="http://schemas.microsoft.com/office/powerpoint/2015/09/main">
+    <mc:Choice Requires="p159">
       <p:transition xmlns:p14="http://schemas.microsoft.com/office/powerpoint/2010/main" spd="slow" p14:dur="2000">
         <p159:morph option="byObject"/>
       </p:transition>
     </mc:Choice>
-    <mc:Fallback>
+    <mc:Fallback xmlns="">
       <p:transition spd="slow">
         <p:fade/>
       </p:transition>
@@ -32215,13 +34361,13 @@
   <p:clrMapOvr>
     <a:masterClrMapping/>
   </p:clrMapOvr>
-  <mc:AlternateContent xmlns:mc="http://schemas.openxmlformats.org/markup-compatibility/2006">
-    <mc:Choice xmlns:p159="http://schemas.microsoft.com/office/powerpoint/2015/09/main" Requires="p159">
+  <mc:AlternateContent xmlns:mc="http://schemas.openxmlformats.org/markup-compatibility/2006" xmlns:p159="http://schemas.microsoft.com/office/powerpoint/2015/09/main">
+    <mc:Choice Requires="p159">
       <p:transition xmlns:p14="http://schemas.microsoft.com/office/powerpoint/2010/main" spd="slow" p14:dur="2000">
         <p159:morph option="byObject"/>
       </p:transition>
     </mc:Choice>
-    <mc:Fallback>
+    <mc:Fallback xmlns="">
       <p:transition spd="slow">
         <p:fade/>
       </p:transition>
@@ -32728,7 +34874,7 @@
         </p:xfrm>
         <a:graphic>
           <a:graphicData uri="http://schemas.openxmlformats.org/drawingml/2006/diagram">
-            <dgm:relIds xmlns:dgm="http://schemas.openxmlformats.org/drawingml/2006/diagram" xmlns:r="http://schemas.openxmlformats.org/officeDocument/2006/relationships" r:dm="rId2" r:lo="rId3" r:qs="rId4" r:cs="rId5"/>
+            <dgm:relIds xmlns:dgm="http://schemas.openxmlformats.org/drawingml/2006/diagram" xmlns:r="http://schemas.openxmlformats.org/officeDocument/2006/relationships" r:dm="rId3" r:lo="rId4" r:qs="rId5" r:cs="rId6"/>
           </a:graphicData>
         </a:graphic>
       </p:graphicFrame>
@@ -32747,7 +34893,7 @@
           <p:nvPr/>
         </p:nvPicPr>
         <p:blipFill>
-          <a:blip r:embed="rId7">
+          <a:blip r:embed="rId8">
             <a:duotone>
               <a:schemeClr val="accent6">
                 <a:shade val="45000"/>
@@ -33318,7 +35464,7 @@
             <a:avLst/>
           </a:prstGeom>
           <a:blipFill>
-            <a:blip r:embed="rId2">
+            <a:blip r:embed="rId3">
               <a:duotone>
                 <a:schemeClr val="accent6">
                   <a:shade val="45000"/>
@@ -33331,7 +35477,7 @@
                   <a14:useLocalDpi xmlns:a14="http://schemas.microsoft.com/office/drawing/2010/main" val="0"/>
                 </a:ext>
                 <a:ext uri="{96DAC541-7B7A-43D3-8B79-37D633B846F1}">
-                  <asvg:svgBlip xmlns:asvg="http://schemas.microsoft.com/office/drawing/2016/SVG/main" r:embed="rId3"/>
+                  <asvg:svgBlip xmlns:asvg="http://schemas.microsoft.com/office/drawing/2016/SVG/main" r:embed="rId4"/>
                 </a:ext>
               </a:extLst>
             </a:blip>
@@ -33390,7 +35536,7 @@
           <p:nvPr/>
         </p:nvPicPr>
         <p:blipFill>
-          <a:blip r:embed="rId4">
+          <a:blip r:embed="rId5">
             <a:duotone>
               <a:schemeClr val="accent6">
                 <a:shade val="45000"/>
@@ -33986,8 +36132,8 @@
         </p:blipFill>
         <p:spPr>
           <a:xfrm>
-            <a:off x="6096000" y="0"/>
-            <a:ext cx="6107073" cy="6858000"/>
+            <a:off x="6096000" y="-268941"/>
+            <a:ext cx="6107073" cy="7126941"/>
           </a:xfrm>
           <a:prstGeom prst="rect">
             <a:avLst/>
@@ -34655,13 +36801,13 @@
           <p:nvPr/>
         </p:nvPicPr>
         <p:blipFill>
-          <a:blip r:embed="rId2">
+          <a:blip r:embed="rId3">
             <a:extLst>
               <a:ext uri="{28A0092B-C50C-407E-A947-70E740481C1C}">
                 <a14:useLocalDpi xmlns:a14="http://schemas.microsoft.com/office/drawing/2010/main" val="0"/>
               </a:ext>
               <a:ext uri="{96DAC541-7B7A-43D3-8B79-37D633B846F1}">
-                <asvg:svgBlip xmlns:asvg="http://schemas.microsoft.com/office/drawing/2016/SVG/main" r:embed="rId3"/>
+                <asvg:svgBlip xmlns:asvg="http://schemas.microsoft.com/office/drawing/2016/SVG/main" r:embed="rId4"/>
               </a:ext>
             </a:extLst>
           </a:blip>
@@ -34694,7 +36840,7 @@
           <p:nvPr/>
         </p:nvPicPr>
         <p:blipFill>
-          <a:blip r:embed="rId4">
+          <a:blip r:embed="rId5">
             <a:duotone>
               <a:schemeClr val="accent6">
                 <a:shade val="45000"/>
@@ -35457,8 +37603,8 @@
         </p:blipFill>
         <p:spPr>
           <a:xfrm>
-            <a:off x="0" y="0"/>
-            <a:ext cx="5338369" cy="6858000"/>
+            <a:off x="145060" y="1494254"/>
+            <a:ext cx="5193310" cy="4706169"/>
           </a:xfrm>
           <a:prstGeom prst="rect">
             <a:avLst/>

</xml_diff>